<commit_message>
Made few changes in slide 5 and 6
</commit_message>
<xml_diff>
--- a/about_me/BrandManagement.pptx
+++ b/about_me/BrandManagement.pptx
@@ -256,445 +256,6 @@
 </p:cmAuthorLst>
 </file>
 
-<file path=ppt/revisionInfo.xml><?xml version="1.0" encoding="utf-8"?>
-<p1510:revInfo xmlns:a="http://schemas.openxmlformats.org/drawingml/2006/main" xmlns:r="http://schemas.openxmlformats.org/officeDocument/2006/relationships" xmlns:p1510="http://schemas.microsoft.com/office/powerpoint/2015/10/main">
-  <p1510:revLst>
-    <p1510:client id="{B89BE772-EAE1-454D-8D55-7315A0DE9F19}" v="48" dt="2020-04-25T10:33:36.087"/>
-  </p1510:revLst>
-</p1510:revInfo>
-</file>
-
-<file path=ppt/changesInfos/changesInfo1.xml><?xml version="1.0" encoding="utf-8"?>
-<pc:chgInfo xmlns:a="http://schemas.openxmlformats.org/drawingml/2006/main" xmlns:r="http://schemas.openxmlformats.org/officeDocument/2006/relationships" xmlns:ac="http://schemas.microsoft.com/office/drawing/2013/main/command" xmlns:pc="http://schemas.microsoft.com/office/powerpoint/2013/main/command">
-  <pc:docChgLst>
-    <pc:chgData name="Vincent Rüegge" userId="ac3338584e172575" providerId="LiveId" clId="{B89BE772-EAE1-454D-8D55-7315A0DE9F19}"/>
-    <pc:docChg chg="undo custSel modSld">
-      <pc:chgData name="Vincent Rüegge" userId="ac3338584e172575" providerId="LiveId" clId="{B89BE772-EAE1-454D-8D55-7315A0DE9F19}" dt="2020-04-25T10:46:10.469" v="6725" actId="20577"/>
-      <pc:docMkLst>
-        <pc:docMk/>
-      </pc:docMkLst>
-      <pc:sldChg chg="modNotesTx">
-        <pc:chgData name="Vincent Rüegge" userId="ac3338584e172575" providerId="LiveId" clId="{B89BE772-EAE1-454D-8D55-7315A0DE9F19}" dt="2020-04-25T10:18:51.548" v="4750" actId="20577"/>
-        <pc:sldMkLst>
-          <pc:docMk/>
-          <pc:sldMk cId="0" sldId="832"/>
-        </pc:sldMkLst>
-      </pc:sldChg>
-      <pc:sldChg chg="delSp modNotesTx">
-        <pc:chgData name="Vincent Rüegge" userId="ac3338584e172575" providerId="LiveId" clId="{B89BE772-EAE1-454D-8D55-7315A0DE9F19}" dt="2020-04-25T10:42:10.565" v="6535" actId="20577"/>
-        <pc:sldMkLst>
-          <pc:docMk/>
-          <pc:sldMk cId="0" sldId="848"/>
-        </pc:sldMkLst>
-        <pc:spChg chg="del">
-          <ac:chgData name="Vincent Rüegge" userId="ac3338584e172575" providerId="LiveId" clId="{B89BE772-EAE1-454D-8D55-7315A0DE9F19}" dt="2020-04-25T08:59:13.291" v="0" actId="478"/>
-          <ac:spMkLst>
-            <pc:docMk/>
-            <pc:sldMk cId="0" sldId="848"/>
-            <ac:spMk id="4" creationId="{00000000-0000-0000-0000-000000000000}"/>
-          </ac:spMkLst>
-        </pc:spChg>
-      </pc:sldChg>
-      <pc:sldChg chg="modSp modNotesTx">
-        <pc:chgData name="Vincent Rüegge" userId="ac3338584e172575" providerId="LiveId" clId="{B89BE772-EAE1-454D-8D55-7315A0DE9F19}" dt="2020-04-25T10:46:10.469" v="6725" actId="20577"/>
-        <pc:sldMkLst>
-          <pc:docMk/>
-          <pc:sldMk cId="0" sldId="849"/>
-        </pc:sldMkLst>
-        <pc:spChg chg="mod">
-          <ac:chgData name="Vincent Rüegge" userId="ac3338584e172575" providerId="LiveId" clId="{B89BE772-EAE1-454D-8D55-7315A0DE9F19}" dt="2020-04-25T10:45:20.594" v="6682" actId="20577"/>
-          <ac:spMkLst>
-            <pc:docMk/>
-            <pc:sldMk cId="0" sldId="849"/>
-            <ac:spMk id="8195" creationId="{00000000-0000-0000-0000-000000000000}"/>
-          </ac:spMkLst>
-        </pc:spChg>
-      </pc:sldChg>
-      <pc:sldChg chg="modSp modNotesTx">
-        <pc:chgData name="Vincent Rüegge" userId="ac3338584e172575" providerId="LiveId" clId="{B89BE772-EAE1-454D-8D55-7315A0DE9F19}" dt="2020-04-25T10:40:47.457" v="6463" actId="20577"/>
-        <pc:sldMkLst>
-          <pc:docMk/>
-          <pc:sldMk cId="0" sldId="861"/>
-        </pc:sldMkLst>
-        <pc:spChg chg="mod">
-          <ac:chgData name="Vincent Rüegge" userId="ac3338584e172575" providerId="LiveId" clId="{B89BE772-EAE1-454D-8D55-7315A0DE9F19}" dt="2020-04-25T10:40:28.464" v="6454" actId="20577"/>
-          <ac:spMkLst>
-            <pc:docMk/>
-            <pc:sldMk cId="0" sldId="861"/>
-            <ac:spMk id="3" creationId="{C68C283B-8D8F-4AD8-8AA8-F611770EA319}"/>
-          </ac:spMkLst>
-        </pc:spChg>
-      </pc:sldChg>
-      <pc:sldChg chg="modSp modNotesTx">
-        <pc:chgData name="Vincent Rüegge" userId="ac3338584e172575" providerId="LiveId" clId="{B89BE772-EAE1-454D-8D55-7315A0DE9F19}" dt="2020-04-25T09:40:48.402" v="1499" actId="20577"/>
-        <pc:sldMkLst>
-          <pc:docMk/>
-          <pc:sldMk cId="1110433661" sldId="862"/>
-        </pc:sldMkLst>
-        <pc:spChg chg="mod">
-          <ac:chgData name="Vincent Rüegge" userId="ac3338584e172575" providerId="LiveId" clId="{B89BE772-EAE1-454D-8D55-7315A0DE9F19}" dt="2020-04-25T09:07:27.981" v="268" actId="1036"/>
-          <ac:spMkLst>
-            <pc:docMk/>
-            <pc:sldMk cId="1110433661" sldId="862"/>
-            <ac:spMk id="37" creationId="{C7978CCC-B0F8-4DFE-B757-D4A28B982001}"/>
-          </ac:spMkLst>
-        </pc:spChg>
-        <pc:spChg chg="mod">
-          <ac:chgData name="Vincent Rüegge" userId="ac3338584e172575" providerId="LiveId" clId="{B89BE772-EAE1-454D-8D55-7315A0DE9F19}" dt="2020-04-25T09:07:59.412" v="305" actId="1076"/>
-          <ac:spMkLst>
-            <pc:docMk/>
-            <pc:sldMk cId="1110433661" sldId="862"/>
-            <ac:spMk id="38" creationId="{0386E3AD-425A-4D6C-BDB8-C2DF4F4A4E85}"/>
-          </ac:spMkLst>
-        </pc:spChg>
-        <pc:spChg chg="mod">
-          <ac:chgData name="Vincent Rüegge" userId="ac3338584e172575" providerId="LiveId" clId="{B89BE772-EAE1-454D-8D55-7315A0DE9F19}" dt="2020-04-25T09:07:27.981" v="268" actId="1036"/>
-          <ac:spMkLst>
-            <pc:docMk/>
-            <pc:sldMk cId="1110433661" sldId="862"/>
-            <ac:spMk id="39" creationId="{67A61387-6880-4592-B1F1-9059BFFEBB2E}"/>
-          </ac:spMkLst>
-        </pc:spChg>
-        <pc:spChg chg="mod">
-          <ac:chgData name="Vincent Rüegge" userId="ac3338584e172575" providerId="LiveId" clId="{B89BE772-EAE1-454D-8D55-7315A0DE9F19}" dt="2020-04-25T09:02:20.275" v="15" actId="20577"/>
-          <ac:spMkLst>
-            <pc:docMk/>
-            <pc:sldMk cId="1110433661" sldId="862"/>
-            <ac:spMk id="11266" creationId="{00000000-0000-0000-0000-000000000000}"/>
-          </ac:spMkLst>
-        </pc:spChg>
-        <pc:spChg chg="mod">
-          <ac:chgData name="Vincent Rüegge" userId="ac3338584e172575" providerId="LiveId" clId="{B89BE772-EAE1-454D-8D55-7315A0DE9F19}" dt="2020-04-25T09:27:18.710" v="476" actId="20577"/>
-          <ac:spMkLst>
-            <pc:docMk/>
-            <pc:sldMk cId="1110433661" sldId="862"/>
-            <ac:spMk id="11267" creationId="{00000000-0000-0000-0000-000000000000}"/>
-          </ac:spMkLst>
-        </pc:spChg>
-        <pc:graphicFrameChg chg="mod">
-          <ac:chgData name="Vincent Rüegge" userId="ac3338584e172575" providerId="LiveId" clId="{B89BE772-EAE1-454D-8D55-7315A0DE9F19}" dt="2020-04-25T09:07:27.981" v="268" actId="1036"/>
-          <ac:graphicFrameMkLst>
-            <pc:docMk/>
-            <pc:sldMk cId="1110433661" sldId="862"/>
-            <ac:graphicFrameMk id="13" creationId="{67E4525E-CAF9-42CF-889E-5CCD0758630D}"/>
-          </ac:graphicFrameMkLst>
-        </pc:graphicFrameChg>
-        <pc:graphicFrameChg chg="mod">
-          <ac:chgData name="Vincent Rüegge" userId="ac3338584e172575" providerId="LiveId" clId="{B89BE772-EAE1-454D-8D55-7315A0DE9F19}" dt="2020-04-25T09:07:27.981" v="268" actId="1036"/>
-          <ac:graphicFrameMkLst>
-            <pc:docMk/>
-            <pc:sldMk cId="1110433661" sldId="862"/>
-            <ac:graphicFrameMk id="14" creationId="{8539A56D-7A8E-40A2-BE2C-577547F816E3}"/>
-          </ac:graphicFrameMkLst>
-        </pc:graphicFrameChg>
-        <pc:graphicFrameChg chg="mod">
-          <ac:chgData name="Vincent Rüegge" userId="ac3338584e172575" providerId="LiveId" clId="{B89BE772-EAE1-454D-8D55-7315A0DE9F19}" dt="2020-04-25T09:07:27.981" v="268" actId="1036"/>
-          <ac:graphicFrameMkLst>
-            <pc:docMk/>
-            <pc:sldMk cId="1110433661" sldId="862"/>
-            <ac:graphicFrameMk id="15" creationId="{8C17DF7A-7CC6-4C43-8B9F-0FFCCB5447A1}"/>
-          </ac:graphicFrameMkLst>
-        </pc:graphicFrameChg>
-        <pc:graphicFrameChg chg="mod">
-          <ac:chgData name="Vincent Rüegge" userId="ac3338584e172575" providerId="LiveId" clId="{B89BE772-EAE1-454D-8D55-7315A0DE9F19}" dt="2020-04-25T09:07:37.720" v="286" actId="1035"/>
-          <ac:graphicFrameMkLst>
-            <pc:docMk/>
-            <pc:sldMk cId="1110433661" sldId="862"/>
-            <ac:graphicFrameMk id="18" creationId="{50FC43FD-6FCD-44FF-967A-9C8A564617F9}"/>
-          </ac:graphicFrameMkLst>
-        </pc:graphicFrameChg>
-        <pc:graphicFrameChg chg="mod modGraphic">
-          <ac:chgData name="Vincent Rüegge" userId="ac3338584e172575" providerId="LiveId" clId="{B89BE772-EAE1-454D-8D55-7315A0DE9F19}" dt="2020-04-25T09:26:55.227" v="457" actId="1036"/>
-          <ac:graphicFrameMkLst>
-            <pc:docMk/>
-            <pc:sldMk cId="1110433661" sldId="862"/>
-            <ac:graphicFrameMk id="34" creationId="{44C93209-B695-43BD-9134-3616C4710206}"/>
-          </ac:graphicFrameMkLst>
-        </pc:graphicFrameChg>
-        <pc:picChg chg="mod">
-          <ac:chgData name="Vincent Rüegge" userId="ac3338584e172575" providerId="LiveId" clId="{B89BE772-EAE1-454D-8D55-7315A0DE9F19}" dt="2020-04-25T09:07:37.720" v="286" actId="1035"/>
-          <ac:picMkLst>
-            <pc:docMk/>
-            <pc:sldMk cId="1110433661" sldId="862"/>
-            <ac:picMk id="3" creationId="{E16066A5-10E3-4351-A3D8-AE2B131F06DE}"/>
-          </ac:picMkLst>
-        </pc:picChg>
-        <pc:picChg chg="mod">
-          <ac:chgData name="Vincent Rüegge" userId="ac3338584e172575" providerId="LiveId" clId="{B89BE772-EAE1-454D-8D55-7315A0DE9F19}" dt="2020-04-25T09:07:27.981" v="268" actId="1036"/>
-          <ac:picMkLst>
-            <pc:docMk/>
-            <pc:sldMk cId="1110433661" sldId="862"/>
-            <ac:picMk id="6" creationId="{00000000-0000-0000-0000-000000000000}"/>
-          </ac:picMkLst>
-        </pc:picChg>
-        <pc:picChg chg="mod">
-          <ac:chgData name="Vincent Rüegge" userId="ac3338584e172575" providerId="LiveId" clId="{B89BE772-EAE1-454D-8D55-7315A0DE9F19}" dt="2020-04-25T09:07:27.981" v="268" actId="1036"/>
-          <ac:picMkLst>
-            <pc:docMk/>
-            <pc:sldMk cId="1110433661" sldId="862"/>
-            <ac:picMk id="7" creationId="{00000000-0000-0000-0000-000000000000}"/>
-          </ac:picMkLst>
-        </pc:picChg>
-        <pc:picChg chg="mod">
-          <ac:chgData name="Vincent Rüegge" userId="ac3338584e172575" providerId="LiveId" clId="{B89BE772-EAE1-454D-8D55-7315A0DE9F19}" dt="2020-04-25T09:07:27.981" v="268" actId="1036"/>
-          <ac:picMkLst>
-            <pc:docMk/>
-            <pc:sldMk cId="1110433661" sldId="862"/>
-            <ac:picMk id="8" creationId="{00000000-0000-0000-0000-000000000000}"/>
-          </ac:picMkLst>
-        </pc:picChg>
-        <pc:picChg chg="mod">
-          <ac:chgData name="Vincent Rüegge" userId="ac3338584e172575" providerId="LiveId" clId="{B89BE772-EAE1-454D-8D55-7315A0DE9F19}" dt="2020-04-25T09:07:27.981" v="268" actId="1036"/>
-          <ac:picMkLst>
-            <pc:docMk/>
-            <pc:sldMk cId="1110433661" sldId="862"/>
-            <ac:picMk id="10" creationId="{00000000-0000-0000-0000-000000000000}"/>
-          </ac:picMkLst>
-        </pc:picChg>
-        <pc:picChg chg="mod">
-          <ac:chgData name="Vincent Rüegge" userId="ac3338584e172575" providerId="LiveId" clId="{B89BE772-EAE1-454D-8D55-7315A0DE9F19}" dt="2020-04-25T09:07:27.981" v="268" actId="1036"/>
-          <ac:picMkLst>
-            <pc:docMk/>
-            <pc:sldMk cId="1110433661" sldId="862"/>
-            <ac:picMk id="11" creationId="{00000000-0000-0000-0000-000000000000}"/>
-          </ac:picMkLst>
-        </pc:picChg>
-        <pc:picChg chg="mod">
-          <ac:chgData name="Vincent Rüegge" userId="ac3338584e172575" providerId="LiveId" clId="{B89BE772-EAE1-454D-8D55-7315A0DE9F19}" dt="2020-04-25T09:07:27.981" v="268" actId="1036"/>
-          <ac:picMkLst>
-            <pc:docMk/>
-            <pc:sldMk cId="1110433661" sldId="862"/>
-            <ac:picMk id="12" creationId="{00000000-0000-0000-0000-000000000000}"/>
-          </ac:picMkLst>
-        </pc:picChg>
-        <pc:picChg chg="mod">
-          <ac:chgData name="Vincent Rüegge" userId="ac3338584e172575" providerId="LiveId" clId="{B89BE772-EAE1-454D-8D55-7315A0DE9F19}" dt="2020-04-25T09:07:27.981" v="268" actId="1036"/>
-          <ac:picMkLst>
-            <pc:docMk/>
-            <pc:sldMk cId="1110433661" sldId="862"/>
-            <ac:picMk id="16" creationId="{00000000-0000-0000-0000-000000000000}"/>
-          </ac:picMkLst>
-        </pc:picChg>
-        <pc:picChg chg="mod">
-          <ac:chgData name="Vincent Rüegge" userId="ac3338584e172575" providerId="LiveId" clId="{B89BE772-EAE1-454D-8D55-7315A0DE9F19}" dt="2020-04-25T09:07:27.981" v="268" actId="1036"/>
-          <ac:picMkLst>
-            <pc:docMk/>
-            <pc:sldMk cId="1110433661" sldId="862"/>
-            <ac:picMk id="17" creationId="{00000000-0000-0000-0000-000000000000}"/>
-          </ac:picMkLst>
-        </pc:picChg>
-        <pc:picChg chg="mod">
-          <ac:chgData name="Vincent Rüegge" userId="ac3338584e172575" providerId="LiveId" clId="{B89BE772-EAE1-454D-8D55-7315A0DE9F19}" dt="2020-04-25T09:07:27.981" v="268" actId="1036"/>
-          <ac:picMkLst>
-            <pc:docMk/>
-            <pc:sldMk cId="1110433661" sldId="862"/>
-            <ac:picMk id="19" creationId="{00000000-0000-0000-0000-000000000000}"/>
-          </ac:picMkLst>
-        </pc:picChg>
-        <pc:picChg chg="mod">
-          <ac:chgData name="Vincent Rüegge" userId="ac3338584e172575" providerId="LiveId" clId="{B89BE772-EAE1-454D-8D55-7315A0DE9F19}" dt="2020-04-25T09:07:27.981" v="268" actId="1036"/>
-          <ac:picMkLst>
-            <pc:docMk/>
-            <pc:sldMk cId="1110433661" sldId="862"/>
-            <ac:picMk id="20" creationId="{00000000-0000-0000-0000-000000000000}"/>
-          </ac:picMkLst>
-        </pc:picChg>
-        <pc:picChg chg="mod">
-          <ac:chgData name="Vincent Rüegge" userId="ac3338584e172575" providerId="LiveId" clId="{B89BE772-EAE1-454D-8D55-7315A0DE9F19}" dt="2020-04-25T09:07:27.981" v="268" actId="1036"/>
-          <ac:picMkLst>
-            <pc:docMk/>
-            <pc:sldMk cId="1110433661" sldId="862"/>
-            <ac:picMk id="21" creationId="{1235F239-8337-4F0A-AF87-A2DB5562EF4C}"/>
-          </ac:picMkLst>
-        </pc:picChg>
-        <pc:picChg chg="mod">
-          <ac:chgData name="Vincent Rüegge" userId="ac3338584e172575" providerId="LiveId" clId="{B89BE772-EAE1-454D-8D55-7315A0DE9F19}" dt="2020-04-25T09:07:27.981" v="268" actId="1036"/>
-          <ac:picMkLst>
-            <pc:docMk/>
-            <pc:sldMk cId="1110433661" sldId="862"/>
-            <ac:picMk id="23" creationId="{00000000-0000-0000-0000-000000000000}"/>
-          </ac:picMkLst>
-        </pc:picChg>
-        <pc:picChg chg="mod">
-          <ac:chgData name="Vincent Rüegge" userId="ac3338584e172575" providerId="LiveId" clId="{B89BE772-EAE1-454D-8D55-7315A0DE9F19}" dt="2020-04-25T09:07:27.981" v="268" actId="1036"/>
-          <ac:picMkLst>
-            <pc:docMk/>
-            <pc:sldMk cId="1110433661" sldId="862"/>
-            <ac:picMk id="24" creationId="{00000000-0000-0000-0000-000000000000}"/>
-          </ac:picMkLst>
-        </pc:picChg>
-        <pc:picChg chg="mod">
-          <ac:chgData name="Vincent Rüegge" userId="ac3338584e172575" providerId="LiveId" clId="{B89BE772-EAE1-454D-8D55-7315A0DE9F19}" dt="2020-04-25T09:07:27.981" v="268" actId="1036"/>
-          <ac:picMkLst>
-            <pc:docMk/>
-            <pc:sldMk cId="1110433661" sldId="862"/>
-            <ac:picMk id="25" creationId="{00000000-0000-0000-0000-000000000000}"/>
-          </ac:picMkLst>
-        </pc:picChg>
-        <pc:picChg chg="mod">
-          <ac:chgData name="Vincent Rüegge" userId="ac3338584e172575" providerId="LiveId" clId="{B89BE772-EAE1-454D-8D55-7315A0DE9F19}" dt="2020-04-25T09:07:27.981" v="268" actId="1036"/>
-          <ac:picMkLst>
-            <pc:docMk/>
-            <pc:sldMk cId="1110433661" sldId="862"/>
-            <ac:picMk id="26" creationId="{00000000-0000-0000-0000-000000000000}"/>
-          </ac:picMkLst>
-        </pc:picChg>
-        <pc:picChg chg="mod">
-          <ac:chgData name="Vincent Rüegge" userId="ac3338584e172575" providerId="LiveId" clId="{B89BE772-EAE1-454D-8D55-7315A0DE9F19}" dt="2020-04-25T09:07:27.981" v="268" actId="1036"/>
-          <ac:picMkLst>
-            <pc:docMk/>
-            <pc:sldMk cId="1110433661" sldId="862"/>
-            <ac:picMk id="30" creationId="{AD27084D-8696-4F1E-8939-12CC604DA47E}"/>
-          </ac:picMkLst>
-        </pc:picChg>
-        <pc:picChg chg="mod">
-          <ac:chgData name="Vincent Rüegge" userId="ac3338584e172575" providerId="LiveId" clId="{B89BE772-EAE1-454D-8D55-7315A0DE9F19}" dt="2020-04-25T09:07:27.981" v="268" actId="1036"/>
-          <ac:picMkLst>
-            <pc:docMk/>
-            <pc:sldMk cId="1110433661" sldId="862"/>
-            <ac:picMk id="31" creationId="{4FF9548A-CF48-43F3-A99C-68923567E03F}"/>
-          </ac:picMkLst>
-        </pc:picChg>
-        <pc:picChg chg="mod">
-          <ac:chgData name="Vincent Rüegge" userId="ac3338584e172575" providerId="LiveId" clId="{B89BE772-EAE1-454D-8D55-7315A0DE9F19}" dt="2020-04-25T09:07:27.981" v="268" actId="1036"/>
-          <ac:picMkLst>
-            <pc:docMk/>
-            <pc:sldMk cId="1110433661" sldId="862"/>
-            <ac:picMk id="32" creationId="{FE34B65D-35C3-4506-A1DA-BD840CE415E0}"/>
-          </ac:picMkLst>
-        </pc:picChg>
-        <pc:picChg chg="mod">
-          <ac:chgData name="Vincent Rüegge" userId="ac3338584e172575" providerId="LiveId" clId="{B89BE772-EAE1-454D-8D55-7315A0DE9F19}" dt="2020-04-25T09:07:51.834" v="304" actId="1076"/>
-          <ac:picMkLst>
-            <pc:docMk/>
-            <pc:sldMk cId="1110433661" sldId="862"/>
-            <ac:picMk id="35" creationId="{E1D98BE6-BB07-40A2-9BF3-3B387461D794}"/>
-          </ac:picMkLst>
-        </pc:picChg>
-        <pc:picChg chg="mod">
-          <ac:chgData name="Vincent Rüegge" userId="ac3338584e172575" providerId="LiveId" clId="{B89BE772-EAE1-454D-8D55-7315A0DE9F19}" dt="2020-04-25T09:07:44.493" v="303" actId="1035"/>
-          <ac:picMkLst>
-            <pc:docMk/>
-            <pc:sldMk cId="1110433661" sldId="862"/>
-            <ac:picMk id="36" creationId="{9BBC5126-35AB-431F-8DEA-61557D201FD0}"/>
-          </ac:picMkLst>
-        </pc:picChg>
-      </pc:sldChg>
-      <pc:sldChg chg="modSp modNotesTx">
-        <pc:chgData name="Vincent Rüegge" userId="ac3338584e172575" providerId="LiveId" clId="{B89BE772-EAE1-454D-8D55-7315A0DE9F19}" dt="2020-04-25T10:16:51.551" v="4747" actId="20577"/>
-        <pc:sldMkLst>
-          <pc:docMk/>
-          <pc:sldMk cId="266091653" sldId="866"/>
-        </pc:sldMkLst>
-        <pc:spChg chg="mod">
-          <ac:chgData name="Vincent Rüegge" userId="ac3338584e172575" providerId="LiveId" clId="{B89BE772-EAE1-454D-8D55-7315A0DE9F19}" dt="2020-04-25T10:05:48.393" v="2897" actId="5793"/>
-          <ac:spMkLst>
-            <pc:docMk/>
-            <pc:sldMk cId="266091653" sldId="866"/>
-            <ac:spMk id="11266" creationId="{00000000-0000-0000-0000-000000000000}"/>
-          </ac:spMkLst>
-        </pc:spChg>
-      </pc:sldChg>
-      <pc:sldChg chg="addSp delSp modSp modNotesTx">
-        <pc:chgData name="Vincent Rüegge" userId="ac3338584e172575" providerId="LiveId" clId="{B89BE772-EAE1-454D-8D55-7315A0DE9F19}" dt="2020-04-25T10:00:53.154" v="2539" actId="20577"/>
-        <pc:sldMkLst>
-          <pc:docMk/>
-          <pc:sldMk cId="2017870631" sldId="868"/>
-        </pc:sldMkLst>
-        <pc:spChg chg="add del mod">
-          <ac:chgData name="Vincent Rüegge" userId="ac3338584e172575" providerId="LiveId" clId="{B89BE772-EAE1-454D-8D55-7315A0DE9F19}" dt="2020-04-25T09:54:58.412" v="2024" actId="20577"/>
-          <ac:spMkLst>
-            <pc:docMk/>
-            <pc:sldMk cId="2017870631" sldId="868"/>
-            <ac:spMk id="6" creationId="{00000000-0000-0000-0000-000000000000}"/>
-          </ac:spMkLst>
-        </pc:spChg>
-        <pc:spChg chg="mod">
-          <ac:chgData name="Vincent Rüegge" userId="ac3338584e172575" providerId="LiveId" clId="{B89BE772-EAE1-454D-8D55-7315A0DE9F19}" dt="2020-04-25T09:50:34.256" v="1872" actId="20577"/>
-          <ac:spMkLst>
-            <pc:docMk/>
-            <pc:sldMk cId="2017870631" sldId="868"/>
-            <ac:spMk id="11" creationId="{00000000-0000-0000-0000-000000000000}"/>
-          </ac:spMkLst>
-        </pc:spChg>
-        <pc:spChg chg="mod">
-          <ac:chgData name="Vincent Rüegge" userId="ac3338584e172575" providerId="LiveId" clId="{B89BE772-EAE1-454D-8D55-7315A0DE9F19}" dt="2020-04-25T09:39:48.593" v="1426" actId="1076"/>
-          <ac:spMkLst>
-            <pc:docMk/>
-            <pc:sldMk cId="2017870631" sldId="868"/>
-            <ac:spMk id="13" creationId="{00000000-0000-0000-0000-000000000000}"/>
-          </ac:spMkLst>
-        </pc:spChg>
-        <pc:spChg chg="mod">
-          <ac:chgData name="Vincent Rüegge" userId="ac3338584e172575" providerId="LiveId" clId="{B89BE772-EAE1-454D-8D55-7315A0DE9F19}" dt="2020-04-25T09:39:48.355" v="1425" actId="1076"/>
-          <ac:spMkLst>
-            <pc:docMk/>
-            <pc:sldMk cId="2017870631" sldId="868"/>
-            <ac:spMk id="14" creationId="{00000000-0000-0000-0000-000000000000}"/>
-          </ac:spMkLst>
-        </pc:spChg>
-        <pc:spChg chg="add del mod">
-          <ac:chgData name="Vincent Rüegge" userId="ac3338584e172575" providerId="LiveId" clId="{B89BE772-EAE1-454D-8D55-7315A0DE9F19}" dt="2020-04-25T09:51:36.712" v="1877" actId="478"/>
-          <ac:spMkLst>
-            <pc:docMk/>
-            <pc:sldMk cId="2017870631" sldId="868"/>
-            <ac:spMk id="17" creationId="{00000000-0000-0000-0000-000000000000}"/>
-          </ac:spMkLst>
-        </pc:spChg>
-        <pc:spChg chg="add del mod">
-          <ac:chgData name="Vincent Rüegge" userId="ac3338584e172575" providerId="LiveId" clId="{B89BE772-EAE1-454D-8D55-7315A0DE9F19}" dt="2020-04-25T09:51:35.203" v="1876" actId="478"/>
-          <ac:spMkLst>
-            <pc:docMk/>
-            <pc:sldMk cId="2017870631" sldId="868"/>
-            <ac:spMk id="21" creationId="{00000000-0000-0000-0000-000000000000}"/>
-          </ac:spMkLst>
-        </pc:spChg>
-        <pc:spChg chg="add del mod">
-          <ac:chgData name="Vincent Rüegge" userId="ac3338584e172575" providerId="LiveId" clId="{B89BE772-EAE1-454D-8D55-7315A0DE9F19}" dt="2020-04-25T09:51:41.557" v="1879" actId="478"/>
-          <ac:spMkLst>
-            <pc:docMk/>
-            <pc:sldMk cId="2017870631" sldId="868"/>
-            <ac:spMk id="22" creationId="{00000000-0000-0000-0000-000000000000}"/>
-          </ac:spMkLst>
-        </pc:spChg>
-        <pc:picChg chg="del mod">
-          <ac:chgData name="Vincent Rüegge" userId="ac3338584e172575" providerId="LiveId" clId="{B89BE772-EAE1-454D-8D55-7315A0DE9F19}" dt="2020-04-25T09:42:34.513" v="1539" actId="478"/>
-          <ac:picMkLst>
-            <pc:docMk/>
-            <pc:sldMk cId="2017870631" sldId="868"/>
-            <ac:picMk id="7" creationId="{00000000-0000-0000-0000-000000000000}"/>
-          </ac:picMkLst>
-        </pc:picChg>
-        <pc:picChg chg="del mod">
-          <ac:chgData name="Vincent Rüegge" userId="ac3338584e172575" providerId="LiveId" clId="{B89BE772-EAE1-454D-8D55-7315A0DE9F19}" dt="2020-04-25T09:42:32.808" v="1538" actId="478"/>
-          <ac:picMkLst>
-            <pc:docMk/>
-            <pc:sldMk cId="2017870631" sldId="868"/>
-            <ac:picMk id="12" creationId="{00000000-0000-0000-0000-000000000000}"/>
-          </ac:picMkLst>
-        </pc:picChg>
-        <pc:picChg chg="add del mod">
-          <ac:chgData name="Vincent Rüegge" userId="ac3338584e172575" providerId="LiveId" clId="{B89BE772-EAE1-454D-8D55-7315A0DE9F19}" dt="2020-04-25T09:51:38.394" v="1878" actId="478"/>
-          <ac:picMkLst>
-            <pc:docMk/>
-            <pc:sldMk cId="2017870631" sldId="868"/>
-            <ac:picMk id="16" creationId="{00000000-0000-0000-0000-000000000000}"/>
-          </ac:picMkLst>
-        </pc:picChg>
-        <pc:picChg chg="add del mod">
-          <ac:chgData name="Vincent Rüegge" userId="ac3338584e172575" providerId="LiveId" clId="{B89BE772-EAE1-454D-8D55-7315A0DE9F19}" dt="2020-04-25T09:51:29.954" v="1875" actId="1076"/>
-          <ac:picMkLst>
-            <pc:docMk/>
-            <pc:sldMk cId="2017870631" sldId="868"/>
-            <ac:picMk id="20" creationId="{00000000-0000-0000-0000-000000000000}"/>
-          </ac:picMkLst>
-        </pc:picChg>
-      </pc:sldChg>
-    </pc:docChg>
-  </pc:docChgLst>
-</pc:chgInfo>
-</file>
-
 <file path=ppt/comments/comment1.xml><?xml version="1.0" encoding="utf-8"?>
 <p:cmLst xmlns:a="http://schemas.openxmlformats.org/drawingml/2006/main" xmlns:r="http://schemas.openxmlformats.org/officeDocument/2006/relationships" xmlns:p="http://schemas.openxmlformats.org/presentationml/2006/main">
   <p:cm authorId="2" dt="2020-04-21T12:14:57.124" idx="1">
@@ -5250,13 +4811,6 @@
         </dgm:presLayoutVars>
       </dgm:prSet>
       <dgm:spPr/>
-      <dgm:t>
-        <a:bodyPr/>
-        <a:lstStyle/>
-        <a:p>
-          <a:endParaRPr lang="en-US"/>
-        </a:p>
-      </dgm:t>
     </dgm:pt>
     <dgm:pt modelId="{DE801391-6078-4642-A904-31F06D589410}" type="pres">
       <dgm:prSet presAssocID="{4F70F4CF-DD21-4008-B481-6BA6CFA8606F}" presName="composite" presStyleCnt="0"/>
@@ -5271,13 +4825,6 @@
         </dgm:presLayoutVars>
       </dgm:prSet>
       <dgm:spPr/>
-      <dgm:t>
-        <a:bodyPr/>
-        <a:lstStyle/>
-        <a:p>
-          <a:endParaRPr lang="en-US"/>
-        </a:p>
-      </dgm:t>
     </dgm:pt>
     <dgm:pt modelId="{C09B49A9-F287-466D-9FA8-2969A250D43B}" type="pres">
       <dgm:prSet presAssocID="{4F70F4CF-DD21-4008-B481-6BA6CFA8606F}" presName="desTx" presStyleLbl="alignAccFollowNode1" presStyleIdx="0" presStyleCnt="1">
@@ -5289,8 +4836,8 @@
     </dgm:pt>
   </dgm:ptLst>
   <dgm:cxnLst>
+    <dgm:cxn modelId="{FC1B8E0B-E31D-49F7-9332-4213C24337DB}" type="presOf" srcId="{4F70F4CF-DD21-4008-B481-6BA6CFA8606F}" destId="{164972D1-934A-430E-8C24-4713175A720E}" srcOrd="0" destOrd="0" presId="urn:microsoft.com/office/officeart/2005/8/layout/hList1"/>
     <dgm:cxn modelId="{0D15C02F-34DA-45EB-896A-D87CF4722274}" type="presOf" srcId="{63340D2B-A71D-43C4-97F7-17D296365ACA}" destId="{7FD6EACB-80AA-4660-88F3-3F7E496F0178}" srcOrd="0" destOrd="0" presId="urn:microsoft.com/office/officeart/2005/8/layout/hList1"/>
-    <dgm:cxn modelId="{FC1B8E0B-E31D-49F7-9332-4213C24337DB}" type="presOf" srcId="{4F70F4CF-DD21-4008-B481-6BA6CFA8606F}" destId="{164972D1-934A-430E-8C24-4713175A720E}" srcOrd="0" destOrd="0" presId="urn:microsoft.com/office/officeart/2005/8/layout/hList1"/>
     <dgm:cxn modelId="{3DDF73A3-C317-4EF4-9B97-ADDAFA89B7FC}" srcId="{63340D2B-A71D-43C4-97F7-17D296365ACA}" destId="{4F70F4CF-DD21-4008-B481-6BA6CFA8606F}" srcOrd="0" destOrd="0" parTransId="{A4D417E5-0CF4-443E-AFE1-7A8972450414}" sibTransId="{EF243263-BB19-4C5B-BE3D-A3FA03F223DD}"/>
     <dgm:cxn modelId="{AE793B27-3CDB-4E0B-B3E7-261288901B16}" type="presParOf" srcId="{7FD6EACB-80AA-4660-88F3-3F7E496F0178}" destId="{DE801391-6078-4642-A904-31F06D589410}" srcOrd="0" destOrd="0" presId="urn:microsoft.com/office/officeart/2005/8/layout/hList1"/>
     <dgm:cxn modelId="{79CAFD43-48E0-4224-9DDF-E43EDADF7415}" type="presParOf" srcId="{DE801391-6078-4642-A904-31F06D589410}" destId="{164972D1-934A-430E-8C24-4713175A720E}" srcOrd="0" destOrd="0" presId="urn:microsoft.com/office/officeart/2005/8/layout/hList1"/>
@@ -5365,13 +4912,6 @@
         </dgm:presLayoutVars>
       </dgm:prSet>
       <dgm:spPr/>
-      <dgm:t>
-        <a:bodyPr/>
-        <a:lstStyle/>
-        <a:p>
-          <a:endParaRPr lang="en-US"/>
-        </a:p>
-      </dgm:t>
     </dgm:pt>
     <dgm:pt modelId="{DE801391-6078-4642-A904-31F06D589410}" type="pres">
       <dgm:prSet presAssocID="{4F70F4CF-DD21-4008-B481-6BA6CFA8606F}" presName="composite" presStyleCnt="0"/>
@@ -5386,13 +4926,6 @@
         </dgm:presLayoutVars>
       </dgm:prSet>
       <dgm:spPr/>
-      <dgm:t>
-        <a:bodyPr/>
-        <a:lstStyle/>
-        <a:p>
-          <a:endParaRPr lang="en-US"/>
-        </a:p>
-      </dgm:t>
     </dgm:pt>
     <dgm:pt modelId="{C09B49A9-F287-466D-9FA8-2969A250D43B}" type="pres">
       <dgm:prSet presAssocID="{4F70F4CF-DD21-4008-B481-6BA6CFA8606F}" presName="desTx" presStyleLbl="alignAccFollowNode1" presStyleIdx="0" presStyleCnt="1">
@@ -5404,8 +4937,8 @@
     </dgm:pt>
   </dgm:ptLst>
   <dgm:cxnLst>
+    <dgm:cxn modelId="{FC1B8E0B-E31D-49F7-9332-4213C24337DB}" type="presOf" srcId="{4F70F4CF-DD21-4008-B481-6BA6CFA8606F}" destId="{164972D1-934A-430E-8C24-4713175A720E}" srcOrd="0" destOrd="0" presId="urn:microsoft.com/office/officeart/2005/8/layout/hList1"/>
     <dgm:cxn modelId="{0D15C02F-34DA-45EB-896A-D87CF4722274}" type="presOf" srcId="{63340D2B-A71D-43C4-97F7-17D296365ACA}" destId="{7FD6EACB-80AA-4660-88F3-3F7E496F0178}" srcOrd="0" destOrd="0" presId="urn:microsoft.com/office/officeart/2005/8/layout/hList1"/>
-    <dgm:cxn modelId="{FC1B8E0B-E31D-49F7-9332-4213C24337DB}" type="presOf" srcId="{4F70F4CF-DD21-4008-B481-6BA6CFA8606F}" destId="{164972D1-934A-430E-8C24-4713175A720E}" srcOrd="0" destOrd="0" presId="urn:microsoft.com/office/officeart/2005/8/layout/hList1"/>
     <dgm:cxn modelId="{3DDF73A3-C317-4EF4-9B97-ADDAFA89B7FC}" srcId="{63340D2B-A71D-43C4-97F7-17D296365ACA}" destId="{4F70F4CF-DD21-4008-B481-6BA6CFA8606F}" srcOrd="0" destOrd="0" parTransId="{A4D417E5-0CF4-443E-AFE1-7A8972450414}" sibTransId="{EF243263-BB19-4C5B-BE3D-A3FA03F223DD}"/>
     <dgm:cxn modelId="{AE793B27-3CDB-4E0B-B3E7-261288901B16}" type="presParOf" srcId="{7FD6EACB-80AA-4660-88F3-3F7E496F0178}" destId="{DE801391-6078-4642-A904-31F06D589410}" srcOrd="0" destOrd="0" presId="urn:microsoft.com/office/officeart/2005/8/layout/hList1"/>
     <dgm:cxn modelId="{79CAFD43-48E0-4224-9DDF-E43EDADF7415}" type="presParOf" srcId="{DE801391-6078-4642-A904-31F06D589410}" destId="{164972D1-934A-430E-8C24-4713175A720E}" srcOrd="0" destOrd="0" presId="urn:microsoft.com/office/officeart/2005/8/layout/hList1"/>
@@ -5480,13 +5013,6 @@
         </dgm:presLayoutVars>
       </dgm:prSet>
       <dgm:spPr/>
-      <dgm:t>
-        <a:bodyPr/>
-        <a:lstStyle/>
-        <a:p>
-          <a:endParaRPr lang="en-US"/>
-        </a:p>
-      </dgm:t>
     </dgm:pt>
     <dgm:pt modelId="{DE801391-6078-4642-A904-31F06D589410}" type="pres">
       <dgm:prSet presAssocID="{4F70F4CF-DD21-4008-B481-6BA6CFA8606F}" presName="composite" presStyleCnt="0"/>
@@ -5501,13 +5027,6 @@
         </dgm:presLayoutVars>
       </dgm:prSet>
       <dgm:spPr/>
-      <dgm:t>
-        <a:bodyPr/>
-        <a:lstStyle/>
-        <a:p>
-          <a:endParaRPr lang="en-US"/>
-        </a:p>
-      </dgm:t>
     </dgm:pt>
     <dgm:pt modelId="{C09B49A9-F287-466D-9FA8-2969A250D43B}" type="pres">
       <dgm:prSet presAssocID="{4F70F4CF-DD21-4008-B481-6BA6CFA8606F}" presName="desTx" presStyleLbl="alignAccFollowNode1" presStyleIdx="0" presStyleCnt="1">
@@ -5519,8 +5038,8 @@
     </dgm:pt>
   </dgm:ptLst>
   <dgm:cxnLst>
+    <dgm:cxn modelId="{FC1B8E0B-E31D-49F7-9332-4213C24337DB}" type="presOf" srcId="{4F70F4CF-DD21-4008-B481-6BA6CFA8606F}" destId="{164972D1-934A-430E-8C24-4713175A720E}" srcOrd="0" destOrd="0" presId="urn:microsoft.com/office/officeart/2005/8/layout/hList1"/>
     <dgm:cxn modelId="{0D15C02F-34DA-45EB-896A-D87CF4722274}" type="presOf" srcId="{63340D2B-A71D-43C4-97F7-17D296365ACA}" destId="{7FD6EACB-80AA-4660-88F3-3F7E496F0178}" srcOrd="0" destOrd="0" presId="urn:microsoft.com/office/officeart/2005/8/layout/hList1"/>
-    <dgm:cxn modelId="{FC1B8E0B-E31D-49F7-9332-4213C24337DB}" type="presOf" srcId="{4F70F4CF-DD21-4008-B481-6BA6CFA8606F}" destId="{164972D1-934A-430E-8C24-4713175A720E}" srcOrd="0" destOrd="0" presId="urn:microsoft.com/office/officeart/2005/8/layout/hList1"/>
     <dgm:cxn modelId="{3DDF73A3-C317-4EF4-9B97-ADDAFA89B7FC}" srcId="{63340D2B-A71D-43C4-97F7-17D296365ACA}" destId="{4F70F4CF-DD21-4008-B481-6BA6CFA8606F}" srcOrd="0" destOrd="0" parTransId="{A4D417E5-0CF4-443E-AFE1-7A8972450414}" sibTransId="{EF243263-BB19-4C5B-BE3D-A3FA03F223DD}"/>
     <dgm:cxn modelId="{AE793B27-3CDB-4E0B-B3E7-261288901B16}" type="presParOf" srcId="{7FD6EACB-80AA-4660-88F3-3F7E496F0178}" destId="{DE801391-6078-4642-A904-31F06D589410}" srcOrd="0" destOrd="0" presId="urn:microsoft.com/office/officeart/2005/8/layout/hList1"/>
     <dgm:cxn modelId="{79CAFD43-48E0-4224-9DDF-E43EDADF7415}" type="presParOf" srcId="{DE801391-6078-4642-A904-31F06D589410}" destId="{164972D1-934A-430E-8C24-4713175A720E}" srcOrd="0" destOrd="0" presId="urn:microsoft.com/office/officeart/2005/8/layout/hList1"/>
@@ -5595,13 +5114,6 @@
         </dgm:presLayoutVars>
       </dgm:prSet>
       <dgm:spPr/>
-      <dgm:t>
-        <a:bodyPr/>
-        <a:lstStyle/>
-        <a:p>
-          <a:endParaRPr lang="en-US"/>
-        </a:p>
-      </dgm:t>
     </dgm:pt>
     <dgm:pt modelId="{DE801391-6078-4642-A904-31F06D589410}" type="pres">
       <dgm:prSet presAssocID="{4F70F4CF-DD21-4008-B481-6BA6CFA8606F}" presName="composite" presStyleCnt="0"/>
@@ -5616,13 +5128,6 @@
         </dgm:presLayoutVars>
       </dgm:prSet>
       <dgm:spPr/>
-      <dgm:t>
-        <a:bodyPr/>
-        <a:lstStyle/>
-        <a:p>
-          <a:endParaRPr lang="en-US"/>
-        </a:p>
-      </dgm:t>
     </dgm:pt>
     <dgm:pt modelId="{C09B49A9-F287-466D-9FA8-2969A250D43B}" type="pres">
       <dgm:prSet presAssocID="{4F70F4CF-DD21-4008-B481-6BA6CFA8606F}" presName="desTx" presStyleLbl="alignAccFollowNode1" presStyleIdx="0" presStyleCnt="1">
@@ -5634,8 +5139,8 @@
     </dgm:pt>
   </dgm:ptLst>
   <dgm:cxnLst>
+    <dgm:cxn modelId="{FC1B8E0B-E31D-49F7-9332-4213C24337DB}" type="presOf" srcId="{4F70F4CF-DD21-4008-B481-6BA6CFA8606F}" destId="{164972D1-934A-430E-8C24-4713175A720E}" srcOrd="0" destOrd="0" presId="urn:microsoft.com/office/officeart/2005/8/layout/hList1"/>
     <dgm:cxn modelId="{0D15C02F-34DA-45EB-896A-D87CF4722274}" type="presOf" srcId="{63340D2B-A71D-43C4-97F7-17D296365ACA}" destId="{7FD6EACB-80AA-4660-88F3-3F7E496F0178}" srcOrd="0" destOrd="0" presId="urn:microsoft.com/office/officeart/2005/8/layout/hList1"/>
-    <dgm:cxn modelId="{FC1B8E0B-E31D-49F7-9332-4213C24337DB}" type="presOf" srcId="{4F70F4CF-DD21-4008-B481-6BA6CFA8606F}" destId="{164972D1-934A-430E-8C24-4713175A720E}" srcOrd="0" destOrd="0" presId="urn:microsoft.com/office/officeart/2005/8/layout/hList1"/>
     <dgm:cxn modelId="{3DDF73A3-C317-4EF4-9B97-ADDAFA89B7FC}" srcId="{63340D2B-A71D-43C4-97F7-17D296365ACA}" destId="{4F70F4CF-DD21-4008-B481-6BA6CFA8606F}" srcOrd="0" destOrd="0" parTransId="{A4D417E5-0CF4-443E-AFE1-7A8972450414}" sibTransId="{EF243263-BB19-4C5B-BE3D-A3FA03F223DD}"/>
     <dgm:cxn modelId="{AE793B27-3CDB-4E0B-B3E7-261288901B16}" type="presParOf" srcId="{7FD6EACB-80AA-4660-88F3-3F7E496F0178}" destId="{DE801391-6078-4642-A904-31F06D589410}" srcOrd="0" destOrd="0" presId="urn:microsoft.com/office/officeart/2005/8/layout/hList1"/>
     <dgm:cxn modelId="{79CAFD43-48E0-4224-9DDF-E43EDADF7415}" type="presParOf" srcId="{DE801391-6078-4642-A904-31F06D589410}" destId="{164972D1-934A-430E-8C24-4713175A720E}" srcOrd="0" destOrd="0" presId="urn:microsoft.com/office/officeart/2005/8/layout/hList1"/>
@@ -5711,13 +5216,6 @@
         </dgm:presLayoutVars>
       </dgm:prSet>
       <dgm:spPr/>
-      <dgm:t>
-        <a:bodyPr/>
-        <a:lstStyle/>
-        <a:p>
-          <a:endParaRPr lang="en-US"/>
-        </a:p>
-      </dgm:t>
     </dgm:pt>
     <dgm:pt modelId="{C3375C94-53B5-4709-ACB6-7EB8DCBBC6E4}" type="pres">
       <dgm:prSet presAssocID="{98112BB7-05EE-4D64-A617-C6DFF9B3C9A2}" presName="composite" presStyleCnt="0"/>
@@ -5732,13 +5230,6 @@
         </dgm:presLayoutVars>
       </dgm:prSet>
       <dgm:spPr/>
-      <dgm:t>
-        <a:bodyPr/>
-        <a:lstStyle/>
-        <a:p>
-          <a:endParaRPr lang="en-US"/>
-        </a:p>
-      </dgm:t>
     </dgm:pt>
     <dgm:pt modelId="{3C2515C0-51EE-43F7-B816-E9E9B76C7F4D}" type="pres">
       <dgm:prSet presAssocID="{98112BB7-05EE-4D64-A617-C6DFF9B3C9A2}" presName="Image" presStyleLbl="bgImgPlace1" presStyleIdx="0" presStyleCnt="1"/>
@@ -5857,13 +5348,6 @@
         </dgm:presLayoutVars>
       </dgm:prSet>
       <dgm:spPr/>
-      <dgm:t>
-        <a:bodyPr/>
-        <a:lstStyle/>
-        <a:p>
-          <a:endParaRPr lang="en-US"/>
-        </a:p>
-      </dgm:t>
     </dgm:pt>
     <dgm:pt modelId="{C3375C94-53B5-4709-ACB6-7EB8DCBBC6E4}" type="pres">
       <dgm:prSet presAssocID="{98112BB7-05EE-4D64-A617-C6DFF9B3C9A2}" presName="composite" presStyleCnt="0"/>
@@ -5878,13 +5362,6 @@
         </dgm:presLayoutVars>
       </dgm:prSet>
       <dgm:spPr/>
-      <dgm:t>
-        <a:bodyPr/>
-        <a:lstStyle/>
-        <a:p>
-          <a:endParaRPr lang="en-US"/>
-        </a:p>
-      </dgm:t>
     </dgm:pt>
     <dgm:pt modelId="{3C2515C0-51EE-43F7-B816-E9E9B76C7F4D}" type="pres">
       <dgm:prSet presAssocID="{98112BB7-05EE-4D64-A617-C6DFF9B3C9A2}" presName="Image" presStyleLbl="bgImgPlace1" presStyleIdx="0" presStyleCnt="1"/>
@@ -5950,7 +5427,7 @@
       </dsp:nvSpPr>
       <dsp:spPr>
         <a:xfrm>
-          <a:off x="0" y="143553"/>
+          <a:off x="0" y="165513"/>
           <a:ext cx="2173635" cy="418586"/>
         </a:xfrm>
         <a:prstGeom prst="rect">
@@ -5992,12 +5469,12 @@
         </a:fontRef>
       </dsp:style>
       <dsp:txBody>
-        <a:bodyPr spcFirstLastPara="0" vert="horz" wrap="square" lIns="135128" tIns="77216" rIns="135128" bIns="77216" numCol="1" spcCol="1270" anchor="ctr" anchorCtr="0">
+        <a:bodyPr spcFirstLastPara="0" vert="horz" wrap="square" lIns="128016" tIns="73152" rIns="128016" bIns="73152" numCol="1" spcCol="1270" anchor="ctr" anchorCtr="0">
           <a:noAutofit/>
         </a:bodyPr>
         <a:lstStyle/>
         <a:p>
-          <a:pPr lvl="0" algn="ctr" defTabSz="844550">
+          <a:pPr marL="0" lvl="0" indent="0" algn="ctr" defTabSz="800100">
             <a:lnSpc>
               <a:spcPct val="90000"/>
             </a:lnSpc>
@@ -6007,15 +5484,16 @@
             <a:spcAft>
               <a:spcPct val="35000"/>
             </a:spcAft>
+            <a:buNone/>
           </a:pPr>
           <a:r>
-            <a:rPr lang="de-CH" sz="1900" b="1" kern="1200"/>
+            <a:rPr lang="de-CH" sz="1800" b="1" kern="1200"/>
             <a:t>Request</a:t>
           </a:r>
         </a:p>
       </dsp:txBody>
       <dsp:txXfrm>
-        <a:off x="0" y="143553"/>
+        <a:off x="0" y="165513"/>
         <a:ext cx="2173635" cy="418586"/>
       </dsp:txXfrm>
     </dsp:sp>
@@ -6026,8 +5504,8 @@
       </dsp:nvSpPr>
       <dsp:spPr>
         <a:xfrm>
-          <a:off x="0" y="520175"/>
-          <a:ext cx="2173635" cy="1010160"/>
+          <a:off x="0" y="542135"/>
+          <a:ext cx="2173635" cy="966240"/>
         </a:xfrm>
         <a:prstGeom prst="rect">
           <a:avLst/>
@@ -6089,7 +5567,7 @@
       </dsp:nvSpPr>
       <dsp:spPr>
         <a:xfrm>
-          <a:off x="0" y="112206"/>
+          <a:off x="0" y="134166"/>
           <a:ext cx="2173635" cy="418586"/>
         </a:xfrm>
         <a:prstGeom prst="rect">
@@ -6131,12 +5609,12 @@
         </a:fontRef>
       </dsp:style>
       <dsp:txBody>
-        <a:bodyPr spcFirstLastPara="0" vert="horz" wrap="square" lIns="135128" tIns="77216" rIns="135128" bIns="77216" numCol="1" spcCol="1270" anchor="ctr" anchorCtr="0">
+        <a:bodyPr spcFirstLastPara="0" vert="horz" wrap="square" lIns="128016" tIns="73152" rIns="128016" bIns="73152" numCol="1" spcCol="1270" anchor="ctr" anchorCtr="0">
           <a:noAutofit/>
         </a:bodyPr>
         <a:lstStyle/>
         <a:p>
-          <a:pPr lvl="0" algn="ctr" defTabSz="844550">
+          <a:pPr marL="0" lvl="0" indent="0" algn="ctr" defTabSz="800100">
             <a:lnSpc>
               <a:spcPct val="90000"/>
             </a:lnSpc>
@@ -6146,15 +5624,16 @@
             <a:spcAft>
               <a:spcPct val="35000"/>
             </a:spcAft>
+            <a:buNone/>
           </a:pPr>
           <a:r>
-            <a:rPr lang="de-CH" sz="1900" b="1" kern="1200"/>
+            <a:rPr lang="de-CH" sz="1800" b="1" kern="1200"/>
             <a:t>Response</a:t>
           </a:r>
         </a:p>
       </dsp:txBody>
       <dsp:txXfrm>
-        <a:off x="0" y="112206"/>
+        <a:off x="0" y="134166"/>
         <a:ext cx="2173635" cy="418586"/>
       </dsp:txXfrm>
     </dsp:sp>
@@ -6165,8 +5644,8 @@
       </dsp:nvSpPr>
       <dsp:spPr>
         <a:xfrm>
-          <a:off x="0" y="488828"/>
-          <a:ext cx="2173635" cy="1010160"/>
+          <a:off x="0" y="510788"/>
+          <a:ext cx="2173635" cy="966240"/>
         </a:xfrm>
         <a:prstGeom prst="rect">
           <a:avLst/>
@@ -6275,7 +5754,7 @@
         </a:bodyPr>
         <a:lstStyle/>
         <a:p>
-          <a:pPr lvl="0" algn="ctr" defTabSz="577850">
+          <a:pPr marL="0" lvl="0" indent="0" algn="ctr" defTabSz="577850">
             <a:lnSpc>
               <a:spcPct val="90000"/>
             </a:lnSpc>
@@ -6285,6 +5764,7 @@
             <a:spcAft>
               <a:spcPct val="35000"/>
             </a:spcAft>
+            <a:buNone/>
           </a:pPr>
           <a:r>
             <a:rPr lang="de-CH" sz="1300" b="1" kern="1200"/>
@@ -6414,7 +5894,7 @@
         </a:bodyPr>
         <a:lstStyle/>
         <a:p>
-          <a:pPr lvl="0" algn="ctr" defTabSz="577850">
+          <a:pPr marL="0" lvl="0" indent="0" algn="ctr" defTabSz="577850">
             <a:lnSpc>
               <a:spcPct val="90000"/>
             </a:lnSpc>
@@ -6424,6 +5904,7 @@
             <a:spcAft>
               <a:spcPct val="35000"/>
             </a:spcAft>
+            <a:buNone/>
           </a:pPr>
           <a:r>
             <a:rPr lang="de-CH" sz="1300" b="1" kern="1200"/>
@@ -6595,12 +6076,12 @@
         </a:fontRef>
       </dsp:style>
       <dsp:txBody>
-        <a:bodyPr spcFirstLastPara="0" vert="horz" wrap="square" lIns="49530" tIns="49530" rIns="49530" bIns="49530" numCol="1" spcCol="1270" anchor="ctr" anchorCtr="0">
+        <a:bodyPr spcFirstLastPara="0" vert="horz" wrap="square" lIns="45720" tIns="45720" rIns="45720" bIns="45720" numCol="1" spcCol="1270" anchor="ctr" anchorCtr="0">
           <a:noAutofit/>
         </a:bodyPr>
         <a:lstStyle/>
         <a:p>
-          <a:pPr lvl="0" algn="ctr" defTabSz="577850">
+          <a:pPr marL="0" lvl="0" indent="0" algn="ctr" defTabSz="533400">
             <a:lnSpc>
               <a:spcPct val="90000"/>
             </a:lnSpc>
@@ -6610,9 +6091,10 @@
             <a:spcAft>
               <a:spcPct val="35000"/>
             </a:spcAft>
+            <a:buNone/>
           </a:pPr>
           <a:r>
-            <a:rPr lang="de-CH" sz="1300" kern="1200"/>
+            <a:rPr lang="de-CH" sz="1200" kern="1200"/>
             <a:t>Input: Brand Image</a:t>
           </a:r>
         </a:p>
@@ -6721,12 +6203,12 @@
         </a:fontRef>
       </dsp:style>
       <dsp:txBody>
-        <a:bodyPr spcFirstLastPara="0" vert="horz" wrap="square" lIns="49530" tIns="49530" rIns="49530" bIns="49530" numCol="1" spcCol="1270" anchor="ctr" anchorCtr="0">
+        <a:bodyPr spcFirstLastPara="0" vert="horz" wrap="square" lIns="45720" tIns="45720" rIns="45720" bIns="45720" numCol="1" spcCol="1270" anchor="ctr" anchorCtr="0">
           <a:noAutofit/>
         </a:bodyPr>
         <a:lstStyle/>
         <a:p>
-          <a:pPr lvl="0" algn="ctr" defTabSz="577850">
+          <a:pPr marL="0" lvl="0" indent="0" algn="ctr" defTabSz="533400">
             <a:lnSpc>
               <a:spcPct val="90000"/>
             </a:lnSpc>
@@ -6736,9 +6218,10 @@
             <a:spcAft>
               <a:spcPct val="35000"/>
             </a:spcAft>
+            <a:buNone/>
           </a:pPr>
           <a:r>
-            <a:rPr lang="de-CH" sz="1300" kern="1200"/>
+            <a:rPr lang="de-CH" sz="1200" kern="1200"/>
             <a:t>Output: Class Label</a:t>
           </a:r>
         </a:p>
@@ -14478,7 +13961,7 @@
             <a:fld id="{1766B9EA-E083-A94D-96A5-C5476B884CFE}" type="datetime1">
               <a:rPr lang="en-US"/>
               <a:pPr/>
-              <a:t>4/25/2020</a:t>
+              <a:t>4/26/2020</a:t>
             </a:fld>
             <a:endParaRPr lang="en-US"/>
           </a:p>
@@ -14669,7 +14152,7 @@
             <a:fld id="{3598794E-35F3-8D48-B244-F21DA91EADA9}" type="datetime1">
               <a:rPr lang="en-US"/>
               <a:pPr/>
-              <a:t>4/25/2020</a:t>
+              <a:t>4/26/2020</a:t>
             </a:fld>
             <a:endParaRPr lang="en-US"/>
           </a:p>
@@ -16015,20 +15498,20 @@
               <a:t> in </a:t>
             </a:r>
             <a:r>
-              <a:rPr lang="de-CH" baseline="0" err="1"/>
+              <a:rPr lang="de-CH" baseline="0" dirty="0" err="1"/>
               <a:t>the</a:t>
             </a:r>
             <a:r>
-              <a:rPr lang="de-CH" baseline="0"/>
-              <a:t> </a:t>
-            </a:r>
-            <a:r>
-              <a:rPr lang="de-CH" baseline="0" smtClean="0"/>
-              <a:t>future which </a:t>
-            </a:r>
-            <a:r>
-              <a:rPr lang="de-CH" baseline="0" dirty="0"/>
-              <a:t>will </a:t>
+              <a:rPr lang="de-CH" baseline="0" dirty="0"/>
+              <a:t> </a:t>
+            </a:r>
+            <a:r>
+              <a:rPr lang="de-CH" baseline="0" dirty="0" err="1"/>
+              <a:t>future</a:t>
+            </a:r>
+            <a:r>
+              <a:rPr lang="de-CH" baseline="0" dirty="0"/>
+              <a:t> will </a:t>
             </a:r>
             <a:r>
               <a:rPr lang="de-CH" baseline="0" dirty="0" err="1"/>
@@ -16461,7 +15944,7 @@
               <a:t> </a:t>
             </a:r>
             <a:r>
-              <a:rPr lang="de-CH" err="1">
+              <a:rPr lang="de-CH" dirty="0" err="1">
                 <a:latin typeface="Source Sans Pro Light" charset="0"/>
                 <a:ea typeface="ヒラギノ角ゴ ProN W3" charset="0"/>
                 <a:cs typeface="Source Sans Pro Light" charset="0"/>
@@ -16469,7 +15952,7 @@
               <a:t>to</a:t>
             </a:r>
             <a:r>
-              <a:rPr lang="de-CH">
+              <a:rPr lang="de-CH" dirty="0">
                 <a:latin typeface="Source Sans Pro Light" charset="0"/>
                 <a:ea typeface="ヒラギノ角ゴ ProN W3" charset="0"/>
                 <a:cs typeface="Source Sans Pro Light" charset="0"/>
@@ -16477,12 +15960,20 @@
               <a:t> </a:t>
             </a:r>
             <a:r>
-              <a:rPr lang="de-CH" smtClean="0">
+              <a:rPr lang="de-CH" dirty="0" err="1">
                 <a:latin typeface="Source Sans Pro Light" charset="0"/>
                 <a:ea typeface="ヒラギノ角ゴ ProN W3" charset="0"/>
                 <a:cs typeface="Source Sans Pro Light" charset="0"/>
               </a:rPr>
-              <a:t>categorize </a:t>
+              <a:t>categorise</a:t>
+            </a:r>
+            <a:r>
+              <a:rPr lang="de-CH" dirty="0">
+                <a:latin typeface="Source Sans Pro Light" charset="0"/>
+                <a:ea typeface="ヒラギノ角ゴ ProN W3" charset="0"/>
+                <a:cs typeface="Source Sans Pro Light" charset="0"/>
+              </a:rPr>
+              <a:t> </a:t>
             </a:r>
             <a:r>
               <a:rPr lang="de-CH" dirty="0" err="1">
@@ -19224,20 +18715,20 @@
               <a:t> </a:t>
             </a:r>
             <a:r>
-              <a:rPr lang="de-CH" baseline="0" err="1"/>
+              <a:rPr lang="de-CH" baseline="0" dirty="0" err="1"/>
               <a:t>getting</a:t>
             </a:r>
             <a:r>
-              <a:rPr lang="de-CH" baseline="0"/>
-              <a:t> </a:t>
-            </a:r>
-            <a:r>
-              <a:rPr lang="de-CH" baseline="0" smtClean="0"/>
-              <a:t>the Twitter and </a:t>
-            </a:r>
-            <a:r>
-              <a:rPr lang="de-CH" baseline="0" dirty="0"/>
-              <a:t>Pinterest API </a:t>
+              <a:rPr lang="de-CH" baseline="0" dirty="0"/>
+              <a:t> </a:t>
+            </a:r>
+            <a:r>
+              <a:rPr lang="de-CH" baseline="0" dirty="0" err="1"/>
+              <a:t>the</a:t>
+            </a:r>
+            <a:r>
+              <a:rPr lang="de-CH" baseline="0" dirty="0"/>
+              <a:t> Pinterest API </a:t>
             </a:r>
             <a:r>
               <a:rPr lang="de-CH" baseline="0" dirty="0" err="1"/>
@@ -21571,7 +21062,7 @@
           </a:ln>
           <a:extLst>
             <a:ext uri="{91240B29-F687-4f45-9708-019B960494DF}">
-              <a14:hiddenLine xmlns="" xmlns:a14="http://schemas.microsoft.com/office/drawing/2010/main" w="9525">
+              <a14:hiddenLine xmlns:a14="http://schemas.microsoft.com/office/drawing/2010/main" xmlns="" w="9525">
                 <a:solidFill>
                   <a:srgbClr val="000000"/>
                 </a:solidFill>
@@ -21731,7 +21222,7 @@
           <a:graphicData uri="http://schemas.openxmlformats.org/presentationml/2006/ole">
             <mc:AlternateContent xmlns:mc="http://schemas.openxmlformats.org/markup-compatibility/2006">
               <mc:Choice xmlns:v="urn:schemas-microsoft-com:vml" Requires="v">
-                <p:oleObj spid="_x0000_s1031" name="think-cell Slide" r:id="rId7" imgW="38100" imgH="38100" progId="TCLayout.ActiveDocument.1">
+                <p:oleObj spid="_x0000_s1030" name="think-cell Slide" r:id="rId7" imgW="38100" imgH="38100" progId="TCLayout.ActiveDocument.1">
                   <p:embed/>
                 </p:oleObj>
               </mc:Choice>
@@ -21773,14 +21264,14 @@
                       </a:ln>
                       <a:extLst>
                         <a:ext uri="{909E8E84-426E-40dd-AFC4-6F175D3DCCD1}">
-                          <a14:hiddenFill xmlns="" xmlns:a14="http://schemas.microsoft.com/office/drawing/2010/main">
+                          <a14:hiddenFill xmlns:a14="http://schemas.microsoft.com/office/drawing/2010/main" xmlns="">
                             <a:solidFill>
                               <a:srgbClr val="FFFFFF"/>
                             </a:solidFill>
                           </a14:hiddenFill>
                         </a:ext>
                         <a:ext uri="{91240B29-F687-4f45-9708-019B960494DF}">
-                          <a14:hiddenLine xmlns="" xmlns:a14="http://schemas.microsoft.com/office/drawing/2010/main" w="9525">
+                          <a14:hiddenLine xmlns:a14="http://schemas.microsoft.com/office/drawing/2010/main" xmlns="" w="9525">
                             <a:solidFill>
                               <a:srgbClr val="000000"/>
                             </a:solidFill>
@@ -22263,14 +21754,14 @@
           </a:ln>
           <a:extLst>
             <a:ext uri="{909E8E84-426E-40dd-AFC4-6F175D3DCCD1}">
-              <a14:hiddenFill xmlns="" xmlns:a14="http://schemas.microsoft.com/office/drawing/2010/main">
+              <a14:hiddenFill xmlns:a14="http://schemas.microsoft.com/office/drawing/2010/main" xmlns="">
                 <a:solidFill>
                   <a:srgbClr val="FFFFFF"/>
                 </a:solidFill>
               </a14:hiddenFill>
             </a:ext>
             <a:ext uri="{91240B29-F687-4f45-9708-019B960494DF}">
-              <a14:hiddenLine xmlns="" xmlns:a14="http://schemas.microsoft.com/office/drawing/2010/main" w="9525">
+              <a14:hiddenLine xmlns:a14="http://schemas.microsoft.com/office/drawing/2010/main" xmlns="" w="9525">
                 <a:solidFill>
                   <a:srgbClr val="000000"/>
                 </a:solidFill>
@@ -22461,7 +21952,7 @@
           </a:ln>
           <a:extLst>
             <a:ext uri="{91240B29-F687-4f45-9708-019B960494DF}">
-              <a14:hiddenLine xmlns="" xmlns:a14="http://schemas.microsoft.com/office/drawing/2010/main" w="9525">
+              <a14:hiddenLine xmlns:a14="http://schemas.microsoft.com/office/drawing/2010/main" xmlns="" w="9525">
                 <a:solidFill>
                   <a:srgbClr val="000000"/>
                 </a:solidFill>
@@ -22621,7 +22112,7 @@
           <a:graphicData uri="http://schemas.openxmlformats.org/presentationml/2006/ole">
             <mc:AlternateContent xmlns:mc="http://schemas.openxmlformats.org/markup-compatibility/2006">
               <mc:Choice xmlns:v="urn:schemas-microsoft-com:vml" Requires="v">
-                <p:oleObj spid="_x0000_s2055" name="think-cell Slide" r:id="rId7" imgW="38100" imgH="38100" progId="TCLayout.ActiveDocument.1">
+                <p:oleObj spid="_x0000_s2054" name="think-cell Slide" r:id="rId7" imgW="38100" imgH="38100" progId="TCLayout.ActiveDocument.1">
                   <p:embed/>
                 </p:oleObj>
               </mc:Choice>
@@ -22663,14 +22154,14 @@
                       </a:ln>
                       <a:extLst>
                         <a:ext uri="{909E8E84-426E-40dd-AFC4-6F175D3DCCD1}">
-                          <a14:hiddenFill xmlns="" xmlns:a14="http://schemas.microsoft.com/office/drawing/2010/main">
+                          <a14:hiddenFill xmlns:a14="http://schemas.microsoft.com/office/drawing/2010/main" xmlns="">
                             <a:solidFill>
                               <a:srgbClr val="FFFFFF"/>
                             </a:solidFill>
                           </a14:hiddenFill>
                         </a:ext>
                         <a:ext uri="{91240B29-F687-4f45-9708-019B960494DF}">
-                          <a14:hiddenLine xmlns="" xmlns:a14="http://schemas.microsoft.com/office/drawing/2010/main" w="9525">
+                          <a14:hiddenLine xmlns:a14="http://schemas.microsoft.com/office/drawing/2010/main" xmlns="" w="9525">
                             <a:solidFill>
                               <a:srgbClr val="000000"/>
                             </a:solidFill>
@@ -23153,14 +22644,14 @@
           </a:ln>
           <a:extLst>
             <a:ext uri="{909E8E84-426E-40dd-AFC4-6F175D3DCCD1}">
-              <a14:hiddenFill xmlns="" xmlns:a14="http://schemas.microsoft.com/office/drawing/2010/main">
+              <a14:hiddenFill xmlns:a14="http://schemas.microsoft.com/office/drawing/2010/main" xmlns="">
                 <a:solidFill>
                   <a:srgbClr val="FFFFFF"/>
                 </a:solidFill>
               </a14:hiddenFill>
             </a:ext>
             <a:ext uri="{91240B29-F687-4f45-9708-019B960494DF}">
-              <a14:hiddenLine xmlns="" xmlns:a14="http://schemas.microsoft.com/office/drawing/2010/main" w="9525">
+              <a14:hiddenLine xmlns:a14="http://schemas.microsoft.com/office/drawing/2010/main" xmlns="" w="9525">
                 <a:solidFill>
                   <a:srgbClr val="000000"/>
                 </a:solidFill>
@@ -23365,14 +22856,14 @@
           </a:ln>
           <a:extLst>
             <a:ext uri="{909E8E84-426E-40dd-AFC4-6F175D3DCCD1}">
-              <a14:hiddenFill xmlns="" xmlns:a14="http://schemas.microsoft.com/office/drawing/2010/main">
+              <a14:hiddenFill xmlns:a14="http://schemas.microsoft.com/office/drawing/2010/main" xmlns="">
                 <a:solidFill>
                   <a:srgbClr val="FFFFFF"/>
                 </a:solidFill>
               </a14:hiddenFill>
             </a:ext>
             <a:ext uri="{91240B29-F687-4f45-9708-019B960494DF}">
-              <a14:hiddenLine xmlns="" xmlns:a14="http://schemas.microsoft.com/office/drawing/2010/main" w="9525">
+              <a14:hiddenLine xmlns:a14="http://schemas.microsoft.com/office/drawing/2010/main" xmlns="" w="9525">
                 <a:solidFill>
                   <a:srgbClr val="000000"/>
                 </a:solidFill>
@@ -26480,14 +25971,14 @@
           </a:ln>
           <a:extLst>
             <a:ext uri="{909E8E84-426E-40dd-AFC4-6F175D3DCCD1}">
-              <a14:hiddenFill xmlns="" xmlns:a14="http://schemas.microsoft.com/office/drawing/2010/main">
+              <a14:hiddenFill xmlns:a14="http://schemas.microsoft.com/office/drawing/2010/main" xmlns="">
                 <a:solidFill>
                   <a:srgbClr val="FFFFFF"/>
                 </a:solidFill>
               </a14:hiddenFill>
             </a:ext>
             <a:ext uri="{91240B29-F687-4f45-9708-019B960494DF}">
-              <a14:hiddenLine xmlns="" xmlns:a14="http://schemas.microsoft.com/office/drawing/2010/main" w="9525">
+              <a14:hiddenLine xmlns:a14="http://schemas.microsoft.com/office/drawing/2010/main" xmlns="" w="9525">
                 <a:solidFill>
                   <a:srgbClr val="000000"/>
                 </a:solidFill>
@@ -27182,7 +26673,7 @@
           </a:xfrm>
           <a:extLst>
             <a:ext uri="{91240B29-F687-4f45-9708-019B960494DF}">
-              <a14:hiddenLine xmlns="" xmlns:a14="http://schemas.microsoft.com/office/drawing/2010/main" w="9525">
+              <a14:hiddenLine xmlns:a14="http://schemas.microsoft.com/office/drawing/2010/main" xmlns="" w="9525">
                 <a:solidFill>
                   <a:srgbClr val="000000"/>
                 </a:solidFill>
@@ -27280,14 +26771,14 @@
           <a:noFill/>
           <a:extLst>
             <a:ext uri="{909E8E84-426E-40dd-AFC4-6F175D3DCCD1}">
-              <a14:hiddenFill xmlns="" xmlns:a14="http://schemas.microsoft.com/office/drawing/2010/main">
+              <a14:hiddenFill xmlns:a14="http://schemas.microsoft.com/office/drawing/2010/main" xmlns="">
                 <a:solidFill>
                   <a:srgbClr val="FFFFFF"/>
                 </a:solidFill>
               </a14:hiddenFill>
             </a:ext>
             <a:ext uri="{91240B29-F687-4f45-9708-019B960494DF}">
-              <a14:hiddenLine xmlns="" xmlns:a14="http://schemas.microsoft.com/office/drawing/2010/main" w="9525">
+              <a14:hiddenLine xmlns:a14="http://schemas.microsoft.com/office/drawing/2010/main" xmlns="" w="9525">
                 <a:solidFill>
                   <a:srgbClr val="000000"/>
                 </a:solidFill>
@@ -27297,7 +26788,7 @@
               </a14:hiddenLine>
             </a:ext>
             <a:ext uri="{FAA26D3D-D897-4be2-8F04-BA451C77F1D7}">
-              <ma14:placeholderFlag xmlns="" xmlns:ma14="http://schemas.microsoft.com/office/mac/drawingml/2011/main" val="1"/>
+              <ma14:placeholderFlag xmlns:ma14="http://schemas.microsoft.com/office/mac/drawingml/2011/main" xmlns="" val="1"/>
             </a:ext>
           </a:extLst>
         </p:spPr>
@@ -27347,14 +26838,14 @@
           <a:noFill/>
           <a:extLst>
             <a:ext uri="{909E8E84-426E-40dd-AFC4-6F175D3DCCD1}">
-              <a14:hiddenFill xmlns="" xmlns:a14="http://schemas.microsoft.com/office/drawing/2010/main">
+              <a14:hiddenFill xmlns:a14="http://schemas.microsoft.com/office/drawing/2010/main" xmlns="">
                 <a:solidFill>
                   <a:srgbClr val="FFFFFF"/>
                 </a:solidFill>
               </a14:hiddenFill>
             </a:ext>
             <a:ext uri="{91240B29-F687-4f45-9708-019B960494DF}">
-              <a14:hiddenLine xmlns="" xmlns:a14="http://schemas.microsoft.com/office/drawing/2010/main" w="9525">
+              <a14:hiddenLine xmlns:a14="http://schemas.microsoft.com/office/drawing/2010/main" xmlns="" w="9525">
                 <a:solidFill>
                   <a:srgbClr val="000000"/>
                 </a:solidFill>
@@ -27418,7 +26909,7 @@
           <a:effectLst/>
           <a:extLst>
             <a:ext uri="{AF507438-7753-43e0-B8FC-AC1667EBCBE1}">
-              <a14:hiddenEffects xmlns="" xmlns:a14="http://schemas.microsoft.com/office/drawing/2010/main">
+              <a14:hiddenEffects xmlns:a14="http://schemas.microsoft.com/office/drawing/2010/main" xmlns="">
                 <a:effectLst>
                   <a:outerShdw blurRad="63500" dist="38099" dir="2700000" algn="ctr" rotWithShape="0">
                     <a:schemeClr val="bg2">
@@ -27547,14 +27038,14 @@
           <a:noFill/>
           <a:extLst>
             <a:ext uri="{909E8E84-426E-40dd-AFC4-6F175D3DCCD1}">
-              <a14:hiddenFill xmlns="" xmlns:a14="http://schemas.microsoft.com/office/drawing/2010/main">
+              <a14:hiddenFill xmlns:a14="http://schemas.microsoft.com/office/drawing/2010/main" xmlns="">
                 <a:solidFill>
                   <a:srgbClr val="FFFFFF"/>
                 </a:solidFill>
               </a14:hiddenFill>
             </a:ext>
             <a:ext uri="{91240B29-F687-4f45-9708-019B960494DF}">
-              <a14:hiddenLine xmlns="" xmlns:a14="http://schemas.microsoft.com/office/drawing/2010/main" w="9525">
+              <a14:hiddenLine xmlns:a14="http://schemas.microsoft.com/office/drawing/2010/main" xmlns="" w="9525">
                 <a:solidFill>
                   <a:srgbClr val="000000"/>
                 </a:solidFill>
@@ -27607,14 +27098,14 @@
           <a:noFill/>
           <a:extLst>
             <a:ext uri="{909E8E84-426E-40dd-AFC4-6F175D3DCCD1}">
-              <a14:hiddenFill xmlns="" xmlns:a14="http://schemas.microsoft.com/office/drawing/2010/main">
+              <a14:hiddenFill xmlns:a14="http://schemas.microsoft.com/office/drawing/2010/main" xmlns="">
                 <a:solidFill>
                   <a:srgbClr val="FFFFFF"/>
                 </a:solidFill>
               </a14:hiddenFill>
             </a:ext>
             <a:ext uri="{91240B29-F687-4f45-9708-019B960494DF}">
-              <a14:hiddenLine xmlns="" xmlns:a14="http://schemas.microsoft.com/office/drawing/2010/main" w="9525">
+              <a14:hiddenLine xmlns:a14="http://schemas.microsoft.com/office/drawing/2010/main" xmlns="" w="9525">
                 <a:solidFill>
                   <a:srgbClr val="000000"/>
                 </a:solidFill>
@@ -28012,14 +27503,14 @@
           <a:noFill/>
           <a:extLst>
             <a:ext uri="{909E8E84-426E-40dd-AFC4-6F175D3DCCD1}">
-              <a14:hiddenFill xmlns="" xmlns:a14="http://schemas.microsoft.com/office/drawing/2010/main">
+              <a14:hiddenFill xmlns:a14="http://schemas.microsoft.com/office/drawing/2010/main" xmlns="">
                 <a:solidFill>
                   <a:srgbClr val="FFFFFF"/>
                 </a:solidFill>
               </a14:hiddenFill>
             </a:ext>
             <a:ext uri="{91240B29-F687-4f45-9708-019B960494DF}">
-              <a14:hiddenLine xmlns="" xmlns:a14="http://schemas.microsoft.com/office/drawing/2010/main" w="9525">
+              <a14:hiddenLine xmlns:a14="http://schemas.microsoft.com/office/drawing/2010/main" xmlns="" w="9525">
                 <a:solidFill>
                   <a:srgbClr val="000000"/>
                 </a:solidFill>
@@ -28029,7 +27520,7 @@
               </a14:hiddenLine>
             </a:ext>
             <a:ext uri="{FAA26D3D-D897-4be2-8F04-BA451C77F1D7}">
-              <ma14:placeholderFlag xmlns="" xmlns:ma14="http://schemas.microsoft.com/office/mac/drawingml/2011/main" val="1"/>
+              <ma14:placeholderFlag xmlns:ma14="http://schemas.microsoft.com/office/mac/drawingml/2011/main" xmlns="" val="1"/>
             </a:ext>
           </a:extLst>
         </p:spPr>
@@ -28108,14 +27599,14 @@
           <a:noFill/>
           <a:extLst>
             <a:ext uri="{909E8E84-426E-40dd-AFC4-6F175D3DCCD1}">
-              <a14:hiddenFill xmlns="" xmlns:a14="http://schemas.microsoft.com/office/drawing/2010/main">
+              <a14:hiddenFill xmlns:a14="http://schemas.microsoft.com/office/drawing/2010/main" xmlns="">
                 <a:solidFill>
                   <a:srgbClr val="FFFFFF"/>
                 </a:solidFill>
               </a14:hiddenFill>
             </a:ext>
             <a:ext uri="{91240B29-F687-4f45-9708-019B960494DF}">
-              <a14:hiddenLine xmlns="" xmlns:a14="http://schemas.microsoft.com/office/drawing/2010/main" w="9525">
+              <a14:hiddenLine xmlns:a14="http://schemas.microsoft.com/office/drawing/2010/main" xmlns="" w="9525">
                 <a:solidFill>
                   <a:srgbClr val="000000"/>
                 </a:solidFill>
@@ -28163,14 +27654,14 @@
           <a:noFill/>
           <a:extLst>
             <a:ext uri="{909E8E84-426E-40dd-AFC4-6F175D3DCCD1}">
-              <a14:hiddenFill xmlns="" xmlns:a14="http://schemas.microsoft.com/office/drawing/2010/main">
+              <a14:hiddenFill xmlns:a14="http://schemas.microsoft.com/office/drawing/2010/main" xmlns="">
                 <a:solidFill>
                   <a:srgbClr val="FFFFFF"/>
                 </a:solidFill>
               </a14:hiddenFill>
             </a:ext>
             <a:ext uri="{91240B29-F687-4f45-9708-019B960494DF}">
-              <a14:hiddenLine xmlns="" xmlns:a14="http://schemas.microsoft.com/office/drawing/2010/main" w="9525">
+              <a14:hiddenLine xmlns:a14="http://schemas.microsoft.com/office/drawing/2010/main" xmlns="" w="9525">
                 <a:solidFill>
                   <a:srgbClr val="000000"/>
                 </a:solidFill>
@@ -28210,7 +27701,7 @@
               <a:t>Task</a:t>
             </a:r>
             <a:r>
-              <a:rPr lang="en-US">
+              <a:rPr lang="en-US" dirty="0">
                 <a:latin typeface="Source Sans Pro Light" charset="0"/>
                 <a:ea typeface="ヒラギノ角ゴ ProN W3" charset="0"/>
                 <a:cs typeface="Source Sans Pro Light" charset="0"/>
@@ -28218,12 +27709,12 @@
               <a:t>: </a:t>
             </a:r>
             <a:r>
-              <a:rPr lang="en-US" smtClean="0">
+              <a:rPr lang="en-US" dirty="0" err="1">
                 <a:latin typeface="Source Sans Pro Light" charset="0"/>
                 <a:ea typeface="ヒラギノ角ゴ ProN W3" charset="0"/>
                 <a:cs typeface="Source Sans Pro Light" charset="0"/>
               </a:rPr>
-              <a:t>Categorize </a:t>
+              <a:t>Categorise</a:t>
             </a:r>
             <a:r>
               <a:rPr lang="en-US" dirty="0">
@@ -28231,7 +27722,7 @@
                 <a:ea typeface="ヒラギノ角ゴ ProN W3" charset="0"/>
                 <a:cs typeface="Source Sans Pro Light" charset="0"/>
               </a:rPr>
-              <a:t>and compare official and unofficial social media brand images to measure how these brands are portrayed on the respective social media platform</a:t>
+              <a:t> and compare official and unofficial social media brand images to measure how these brands are portrayed on the respective social media platform</a:t>
             </a:r>
           </a:p>
           <a:p>
@@ -28311,13 +27802,13 @@
           <p:nvPr>
             <p:extLst>
               <p:ext uri="{D42A27DB-BD31-4B8C-83A1-F6EECF244321}">
-                <p14:modId xmlns:p14="http://schemas.microsoft.com/office/powerpoint/2010/main" val="2744619593"/>
+                <p14:modId xmlns:p14="http://schemas.microsoft.com/office/powerpoint/2010/main" val="2764603965"/>
               </p:ext>
             </p:extLst>
           </p:nvPr>
         </p:nvGraphicFramePr>
         <p:xfrm>
-          <a:off x="641145" y="3864692"/>
+          <a:off x="619125" y="3533783"/>
           <a:ext cx="2173635" cy="1673889"/>
         </p:xfrm>
         <a:graphic>
@@ -28341,13 +27832,13 @@
           <p:nvPr>
             <p:extLst>
               <p:ext uri="{D42A27DB-BD31-4B8C-83A1-F6EECF244321}">
-                <p14:modId xmlns:p14="http://schemas.microsoft.com/office/powerpoint/2010/main" val="1884614399"/>
+                <p14:modId xmlns:p14="http://schemas.microsoft.com/office/powerpoint/2010/main" val="2947203165"/>
               </p:ext>
             </p:extLst>
           </p:nvPr>
         </p:nvGraphicFramePr>
         <p:xfrm>
-          <a:off x="7121463" y="3864692"/>
+          <a:off x="7099443" y="3533783"/>
           <a:ext cx="2173635" cy="1611195"/>
         </p:xfrm>
         <a:graphic>
@@ -28371,13 +27862,13 @@
           <p:nvPr>
             <p:extLst>
               <p:ext uri="{D42A27DB-BD31-4B8C-83A1-F6EECF244321}">
-                <p14:modId xmlns:p14="http://schemas.microsoft.com/office/powerpoint/2010/main" val="4145561681"/>
+                <p14:modId xmlns:p14="http://schemas.microsoft.com/office/powerpoint/2010/main" val="1301867484"/>
               </p:ext>
             </p:extLst>
           </p:nvPr>
         </p:nvGraphicFramePr>
         <p:xfrm>
-          <a:off x="3881304" y="3833601"/>
+          <a:off x="3859284" y="3502692"/>
           <a:ext cx="2173635" cy="973573"/>
         </p:xfrm>
         <a:graphic>
@@ -28401,13 +27892,13 @@
           <p:nvPr>
             <p:extLst>
               <p:ext uri="{D42A27DB-BD31-4B8C-83A1-F6EECF244321}">
-                <p14:modId xmlns:p14="http://schemas.microsoft.com/office/powerpoint/2010/main" val="1274403121"/>
+                <p14:modId xmlns:p14="http://schemas.microsoft.com/office/powerpoint/2010/main" val="182136728"/>
               </p:ext>
             </p:extLst>
           </p:nvPr>
         </p:nvGraphicFramePr>
         <p:xfrm>
-          <a:off x="3888202" y="5108901"/>
+          <a:off x="3866182" y="4777992"/>
           <a:ext cx="2173635" cy="973573"/>
         </p:xfrm>
         <a:graphic>
@@ -28434,7 +27925,7 @@
           <a:blip r:embed="rId23">
             <a:extLst>
               <a:ext uri="{96DAC541-7B7A-43D3-8B79-37D633B846F1}">
-                <asvg:svgBlip xmlns:asvg="http://schemas.microsoft.com/office/drawing/2016/SVG/main" xmlns="" r:embed="rId24"/>
+                <asvg:svgBlip xmlns:asvg="http://schemas.microsoft.com/office/drawing/2016/SVG/main" r:embed="rId24"/>
               </a:ext>
             </a:extLst>
           </a:blip>
@@ -28444,7 +27935,7 @@
         </p:blipFill>
         <p:spPr>
           <a:xfrm rot="21087087">
-            <a:off x="2919344" y="3996846"/>
+            <a:off x="2897324" y="3665937"/>
             <a:ext cx="720000" cy="720000"/>
           </a:xfrm>
           <a:prstGeom prst="rect">
@@ -28470,7 +27961,7 @@
           <a:blip r:embed="rId23">
             <a:extLst>
               <a:ext uri="{96DAC541-7B7A-43D3-8B79-37D633B846F1}">
-                <asvg:svgBlip xmlns:asvg="http://schemas.microsoft.com/office/drawing/2016/SVG/main" xmlns="" r:embed="rId24"/>
+                <asvg:svgBlip xmlns:asvg="http://schemas.microsoft.com/office/drawing/2016/SVG/main" r:embed="rId24"/>
               </a:ext>
             </a:extLst>
           </a:blip>
@@ -28480,7 +27971,7 @@
         </p:blipFill>
         <p:spPr>
           <a:xfrm rot="3292379">
-            <a:off x="6341557" y="3956923"/>
+            <a:off x="6319537" y="3626014"/>
             <a:ext cx="720000" cy="720000"/>
           </a:xfrm>
           <a:prstGeom prst="rect">
@@ -28506,7 +27997,7 @@
           <a:blip r:embed="rId25">
             <a:extLst>
               <a:ext uri="{96DAC541-7B7A-43D3-8B79-37D633B846F1}">
-                <asvg:svgBlip xmlns:asvg="http://schemas.microsoft.com/office/drawing/2016/SVG/main" xmlns="" r:embed="rId26"/>
+                <asvg:svgBlip xmlns:asvg="http://schemas.microsoft.com/office/drawing/2016/SVG/main" r:embed="rId26"/>
               </a:ext>
             </a:extLst>
           </a:blip>
@@ -28516,7 +28007,7 @@
         </p:blipFill>
         <p:spPr>
           <a:xfrm>
-            <a:off x="1377979" y="4576602"/>
+            <a:off x="1355959" y="4245693"/>
             <a:ext cx="720000" cy="720000"/>
           </a:xfrm>
           <a:prstGeom prst="rect">
@@ -28542,7 +28033,7 @@
           <a:blip r:embed="rId27">
             <a:extLst>
               <a:ext uri="{96DAC541-7B7A-43D3-8B79-37D633B846F1}">
-                <asvg:svgBlip xmlns:asvg="http://schemas.microsoft.com/office/drawing/2016/SVG/main" xmlns="" r:embed="rId28"/>
+                <asvg:svgBlip xmlns:asvg="http://schemas.microsoft.com/office/drawing/2016/SVG/main" r:embed="rId28"/>
               </a:ext>
             </a:extLst>
           </a:blip>
@@ -28552,7 +28043,7 @@
         </p:blipFill>
         <p:spPr>
           <a:xfrm>
-            <a:off x="7848280" y="4526559"/>
+            <a:off x="7826260" y="4195650"/>
             <a:ext cx="720000" cy="720000"/>
           </a:xfrm>
           <a:prstGeom prst="rect">
@@ -28578,7 +28069,7 @@
           <a:blip r:embed="rId29">
             <a:extLst>
               <a:ext uri="{96DAC541-7B7A-43D3-8B79-37D633B846F1}">
-                <asvg:svgBlip xmlns:asvg="http://schemas.microsoft.com/office/drawing/2016/SVG/main" xmlns="" r:embed="rId30"/>
+                <asvg:svgBlip xmlns:asvg="http://schemas.microsoft.com/office/drawing/2016/SVG/main" r:embed="rId30"/>
               </a:ext>
             </a:extLst>
           </a:blip>
@@ -28588,7 +28079,7 @@
         </p:blipFill>
         <p:spPr>
           <a:xfrm>
-            <a:off x="4608121" y="4078428"/>
+            <a:off x="4586101" y="3747519"/>
             <a:ext cx="720000" cy="720000"/>
           </a:xfrm>
           <a:prstGeom prst="rect">
@@ -28614,7 +28105,7 @@
           <a:blip r:embed="rId31">
             <a:extLst>
               <a:ext uri="{96DAC541-7B7A-43D3-8B79-37D633B846F1}">
-                <asvg:svgBlip xmlns:asvg="http://schemas.microsoft.com/office/drawing/2016/SVG/main" xmlns="" r:embed="rId32"/>
+                <asvg:svgBlip xmlns:asvg="http://schemas.microsoft.com/office/drawing/2016/SVG/main" r:embed="rId32"/>
               </a:ext>
             </a:extLst>
           </a:blip>
@@ -28624,7 +28115,7 @@
         </p:blipFill>
         <p:spPr>
           <a:xfrm>
-            <a:off x="4705019" y="5488101"/>
+            <a:off x="4682999" y="5157192"/>
             <a:ext cx="540000" cy="540000"/>
           </a:xfrm>
           <a:prstGeom prst="rect">
@@ -28646,7 +28137,7 @@
         </p:nvSpPr>
         <p:spPr bwMode="auto">
           <a:xfrm>
-            <a:off x="198802" y="5475887"/>
+            <a:off x="176782" y="5144978"/>
             <a:ext cx="2557091" cy="696290"/>
           </a:xfrm>
           <a:prstGeom prst="wedgeRoundRectCallout">
@@ -28669,7 +28160,7 @@
           <a:effectLst/>
           <a:extLst>
             <a:ext uri="{AF507438-7753-43e0-B8FC-AC1667EBCBE1}">
-              <a14:hiddenEffects xmlns="" xmlns:a14="http://schemas.microsoft.com/office/drawing/2010/main">
+              <a14:hiddenEffects xmlns:a14="http://schemas.microsoft.com/office/drawing/2010/main" xmlns="">
                 <a:effectLst>
                   <a:outerShdw blurRad="63500" dist="38099" dir="2700000" algn="ctr" rotWithShape="0">
                     <a:schemeClr val="bg2">
@@ -28829,7 +28320,7 @@
         </p:nvSpPr>
         <p:spPr bwMode="auto">
           <a:xfrm>
-            <a:off x="5572816" y="4793691"/>
+            <a:off x="5550796" y="4462782"/>
             <a:ext cx="1405813" cy="280096"/>
           </a:xfrm>
           <a:prstGeom prst="wedgeRoundRectCallout">
@@ -28852,7 +28343,7 @@
           <a:effectLst/>
           <a:extLst>
             <a:ext uri="{AF507438-7753-43e0-B8FC-AC1667EBCBE1}">
-              <a14:hiddenEffects xmlns="" xmlns:a14="http://schemas.microsoft.com/office/drawing/2010/main">
+              <a14:hiddenEffects xmlns:a14="http://schemas.microsoft.com/office/drawing/2010/main" xmlns="">
                 <a:effectLst>
                   <a:outerShdw blurRad="63500" dist="38099" dir="2700000" algn="ctr" rotWithShape="0">
                     <a:schemeClr val="bg2">
@@ -28921,7 +28412,7 @@
         </p:nvSpPr>
         <p:spPr bwMode="auto">
           <a:xfrm>
-            <a:off x="8136749" y="5475886"/>
+            <a:off x="8114729" y="5144977"/>
             <a:ext cx="1710490" cy="696291"/>
           </a:xfrm>
           <a:prstGeom prst="wedgeRoundRectCallout">
@@ -28944,7 +28435,7 @@
           <a:effectLst/>
           <a:extLst>
             <a:ext uri="{AF507438-7753-43e0-B8FC-AC1667EBCBE1}">
-              <a14:hiddenEffects xmlns="" xmlns:a14="http://schemas.microsoft.com/office/drawing/2010/main">
+              <a14:hiddenEffects xmlns:a14="http://schemas.microsoft.com/office/drawing/2010/main" xmlns="">
                 <a:effectLst>
                   <a:outerShdw blurRad="63500" dist="38099" dir="2700000" algn="ctr" rotWithShape="0">
                     <a:schemeClr val="bg2">
@@ -29049,7 +28540,7 @@
           <a:blip r:embed="rId33">
             <a:extLst>
               <a:ext uri="{96DAC541-7B7A-43D3-8B79-37D633B846F1}">
-                <asvg:svgBlip xmlns:asvg="http://schemas.microsoft.com/office/drawing/2016/SVG/main" xmlns="" r:embed="rId34"/>
+                <asvg:svgBlip xmlns:asvg="http://schemas.microsoft.com/office/drawing/2016/SVG/main" r:embed="rId34"/>
               </a:ext>
             </a:extLst>
           </a:blip>
@@ -29059,7 +28550,7 @@
         </p:blipFill>
         <p:spPr>
           <a:xfrm rot="5400000">
-            <a:off x="4852087" y="4782962"/>
+            <a:off x="4830067" y="4452053"/>
             <a:ext cx="245866" cy="360000"/>
           </a:xfrm>
           <a:prstGeom prst="rect">
@@ -29086,14 +28577,14 @@
           <a:noFill/>
           <a:extLst>
             <a:ext uri="{909E8E84-426E-40dd-AFC4-6F175D3DCCD1}">
-              <a14:hiddenFill xmlns="" xmlns:a14="http://schemas.microsoft.com/office/drawing/2010/main">
+              <a14:hiddenFill xmlns:a14="http://schemas.microsoft.com/office/drawing/2010/main" xmlns="">
                 <a:solidFill>
                   <a:srgbClr val="FFFFFF"/>
                 </a:solidFill>
               </a14:hiddenFill>
             </a:ext>
             <a:ext uri="{91240B29-F687-4f45-9708-019B960494DF}">
-              <a14:hiddenLine xmlns="" xmlns:a14="http://schemas.microsoft.com/office/drawing/2010/main" w="9525">
+              <a14:hiddenLine xmlns:a14="http://schemas.microsoft.com/office/drawing/2010/main" xmlns="" w="9525">
                 <a:solidFill>
                   <a:srgbClr val="000000"/>
                 </a:solidFill>
@@ -29103,7 +28594,7 @@
               </a14:hiddenLine>
             </a:ext>
             <a:ext uri="{FAA26D3D-D897-4be2-8F04-BA451C77F1D7}">
-              <ma14:placeholderFlag xmlns="" xmlns:ma14="http://schemas.microsoft.com/office/mac/drawingml/2011/main" val="1"/>
+              <ma14:placeholderFlag xmlns:ma14="http://schemas.microsoft.com/office/mac/drawingml/2011/main" xmlns="" val="1"/>
             </a:ext>
           </a:extLst>
         </p:spPr>
@@ -29387,7 +28878,7 @@
         </p:blipFill>
         <p:spPr>
           <a:xfrm>
-            <a:off x="6681490" y="5064256"/>
+            <a:off x="6659470" y="4733347"/>
             <a:ext cx="439972" cy="438321"/>
           </a:xfrm>
           <a:prstGeom prst="rect">
@@ -29410,7 +28901,7 @@
         </p:blipFill>
         <p:spPr>
           <a:xfrm>
-            <a:off x="6180071" y="5051573"/>
+            <a:off x="6158051" y="4720664"/>
             <a:ext cx="452621" cy="449250"/>
           </a:xfrm>
           <a:prstGeom prst="rect">
@@ -29434,7 +28925,7 @@
         </p:blipFill>
         <p:spPr>
           <a:xfrm>
-            <a:off x="3915095" y="3521188"/>
+            <a:off x="3893075" y="3190279"/>
             <a:ext cx="525280" cy="294157"/>
           </a:xfrm>
           <a:prstGeom prst="rect">
@@ -29457,7 +28948,7 @@
         </p:blipFill>
         <p:spPr>
           <a:xfrm>
-            <a:off x="2536317" y="3521305"/>
+            <a:off x="2514297" y="3190396"/>
             <a:ext cx="433852" cy="439885"/>
           </a:xfrm>
           <a:prstGeom prst="rect">
@@ -29481,7 +28972,7 @@
         </p:blipFill>
         <p:spPr>
           <a:xfrm>
-            <a:off x="1533742" y="3533621"/>
+            <a:off x="1511722" y="3202712"/>
             <a:ext cx="985466" cy="422343"/>
           </a:xfrm>
           <a:prstGeom prst="rect">
@@ -29505,7 +28996,7 @@
         </p:blipFill>
         <p:spPr>
           <a:xfrm>
-            <a:off x="2822654" y="5382186"/>
+            <a:off x="2800634" y="5051277"/>
             <a:ext cx="1007413" cy="426325"/>
           </a:xfrm>
           <a:prstGeom prst="rect">
@@ -29528,7 +29019,7 @@
         </p:blipFill>
         <p:spPr>
           <a:xfrm>
-            <a:off x="6997714" y="5450493"/>
+            <a:off x="6975694" y="5119584"/>
             <a:ext cx="1113034" cy="408993"/>
           </a:xfrm>
           <a:prstGeom prst="rect">
@@ -29552,7 +29043,7 @@
         </p:blipFill>
         <p:spPr>
           <a:xfrm>
-            <a:off x="2992894" y="5030699"/>
+            <a:off x="2970874" y="4699790"/>
             <a:ext cx="751134" cy="292921"/>
           </a:xfrm>
           <a:prstGeom prst="rect">
@@ -29576,7 +29067,7 @@
         </p:blipFill>
         <p:spPr>
           <a:xfrm>
-            <a:off x="3052833" y="5808511"/>
+            <a:off x="3030813" y="5477602"/>
             <a:ext cx="745059" cy="301823"/>
           </a:xfrm>
           <a:prstGeom prst="rect">
@@ -29599,7 +29090,7 @@
         </p:blipFill>
         <p:spPr>
           <a:xfrm>
-            <a:off x="297715" y="3540076"/>
+            <a:off x="275695" y="3209167"/>
             <a:ext cx="1222499" cy="415888"/>
           </a:xfrm>
           <a:prstGeom prst="rect">
@@ -29623,7 +29114,7 @@
         </p:blipFill>
         <p:spPr>
           <a:xfrm>
-            <a:off x="3015004" y="3543904"/>
+            <a:off x="2992984" y="3212995"/>
             <a:ext cx="740557" cy="362204"/>
           </a:xfrm>
           <a:prstGeom prst="rect">
@@ -29647,7 +29138,7 @@
         </p:blipFill>
         <p:spPr>
           <a:xfrm>
-            <a:off x="3026056" y="4586465"/>
+            <a:off x="3004036" y="4255556"/>
             <a:ext cx="591468" cy="318929"/>
           </a:xfrm>
           <a:prstGeom prst="rect">
@@ -29671,7 +29162,7 @@
         </p:blipFill>
         <p:spPr>
           <a:xfrm>
-            <a:off x="4594416" y="3482181"/>
+            <a:off x="4572396" y="3151272"/>
             <a:ext cx="918986" cy="342123"/>
           </a:xfrm>
           <a:prstGeom prst="rect">
@@ -29694,7 +29185,7 @@
         </p:blipFill>
         <p:spPr>
           <a:xfrm>
-            <a:off x="6139367" y="5549587"/>
+            <a:off x="6117347" y="5218678"/>
             <a:ext cx="770607" cy="318294"/>
           </a:xfrm>
           <a:prstGeom prst="rect">
@@ -29717,14 +29208,14 @@
           <p:nvPr>
             <p:extLst>
               <p:ext uri="{D42A27DB-BD31-4B8C-83A1-F6EECF244321}">
-                <p14:modId xmlns:p14="http://schemas.microsoft.com/office/powerpoint/2010/main" val="988352026"/>
+                <p14:modId xmlns:p14="http://schemas.microsoft.com/office/powerpoint/2010/main" val="4104520085"/>
               </p:ext>
             </p:extLst>
           </p:nvPr>
         </p:nvGraphicFramePr>
         <p:xfrm>
-          <a:off x="6638791" y="2830407"/>
-          <a:ext cx="2656307" cy="975360"/>
+          <a:off x="6616771" y="2499498"/>
+          <a:ext cx="2656307" cy="821490"/>
         </p:xfrm>
         <a:graphic>
           <a:graphicData uri="http://schemas.openxmlformats.org/drawingml/2006/table">
@@ -29990,14 +29481,14 @@
           <a:noFill/>
           <a:extLst>
             <a:ext uri="{909E8E84-426E-40dd-AFC4-6F175D3DCCD1}">
-              <a14:hiddenFill xmlns="" xmlns:a14="http://schemas.microsoft.com/office/drawing/2010/main">
+              <a14:hiddenFill xmlns:a14="http://schemas.microsoft.com/office/drawing/2010/main" xmlns="">
                 <a:solidFill>
                   <a:srgbClr val="FFFFFF"/>
                 </a:solidFill>
               </a14:hiddenFill>
             </a:ext>
             <a:ext uri="{91240B29-F687-4f45-9708-019B960494DF}">
-              <a14:hiddenLine xmlns="" xmlns:a14="http://schemas.microsoft.com/office/drawing/2010/main" w="9525">
+              <a14:hiddenLine xmlns:a14="http://schemas.microsoft.com/office/drawing/2010/main" xmlns="" w="9525">
                 <a:solidFill>
                   <a:srgbClr val="000000"/>
                 </a:solidFill>
@@ -30089,14 +29580,14 @@
           <a:noFill/>
           <a:extLst>
             <a:ext uri="{909E8E84-426E-40dd-AFC4-6F175D3DCCD1}">
-              <a14:hiddenFill xmlns="" xmlns:a14="http://schemas.microsoft.com/office/drawing/2010/main">
+              <a14:hiddenFill xmlns:a14="http://schemas.microsoft.com/office/drawing/2010/main" xmlns="">
                 <a:solidFill>
                   <a:srgbClr val="FFFFFF"/>
                 </a:solidFill>
               </a14:hiddenFill>
             </a:ext>
             <a:ext uri="{91240B29-F687-4f45-9708-019B960494DF}">
-              <a14:hiddenLine xmlns="" xmlns:a14="http://schemas.microsoft.com/office/drawing/2010/main" w="9525">
+              <a14:hiddenLine xmlns:a14="http://schemas.microsoft.com/office/drawing/2010/main" xmlns="" w="9525">
                 <a:solidFill>
                   <a:srgbClr val="000000"/>
                 </a:solidFill>
@@ -30106,7 +29597,7 @@
               </a14:hiddenLine>
             </a:ext>
             <a:ext uri="{FAA26D3D-D897-4be2-8F04-BA451C77F1D7}">
-              <ma14:placeholderFlag xmlns="" xmlns:ma14="http://schemas.microsoft.com/office/mac/drawingml/2011/main" val="1"/>
+              <ma14:placeholderFlag xmlns:ma14="http://schemas.microsoft.com/office/mac/drawingml/2011/main" xmlns="" val="1"/>
             </a:ext>
           </a:extLst>
         </p:spPr>
@@ -31156,7 +30647,7 @@
                   <a14:useLocalDpi xmlns:a14="http://schemas.microsoft.com/office/drawing/2010/main" val="0"/>
                 </a:ext>
                 <a:ext uri="{96DAC541-7B7A-43D3-8B79-37D633B846F1}">
-                  <asvg:svgBlip xmlns:asvg="http://schemas.microsoft.com/office/drawing/2016/SVG/main" xmlns="" r:embed="rId4"/>
+                  <asvg:svgBlip xmlns:asvg="http://schemas.microsoft.com/office/drawing/2016/SVG/main" r:embed="rId4"/>
                 </a:ext>
               </a:extLst>
             </a:blip>
@@ -31219,7 +30710,7 @@
                   <a14:useLocalDpi xmlns:a14="http://schemas.microsoft.com/office/drawing/2010/main" val="0"/>
                 </a:ext>
                 <a:ext uri="{96DAC541-7B7A-43D3-8B79-37D633B846F1}">
-                  <asvg:svgBlip xmlns:asvg="http://schemas.microsoft.com/office/drawing/2016/SVG/main" xmlns="" r:embed="rId6"/>
+                  <asvg:svgBlip xmlns:asvg="http://schemas.microsoft.com/office/drawing/2016/SVG/main" r:embed="rId6"/>
                 </a:ext>
               </a:extLst>
             </a:blip>
@@ -31282,7 +30773,7 @@
                   <a14:useLocalDpi xmlns:a14="http://schemas.microsoft.com/office/drawing/2010/main" val="0"/>
                 </a:ext>
                 <a:ext uri="{96DAC541-7B7A-43D3-8B79-37D633B846F1}">
-                  <asvg:svgBlip xmlns:asvg="http://schemas.microsoft.com/office/drawing/2016/SVG/main" xmlns="" r:embed="rId8"/>
+                  <asvg:svgBlip xmlns:asvg="http://schemas.microsoft.com/office/drawing/2016/SVG/main" r:embed="rId8"/>
                 </a:ext>
               </a:extLst>
             </a:blip>
@@ -31562,14 +31053,14 @@
           <a:noFill/>
           <a:extLst>
             <a:ext uri="{909E8E84-426E-40dd-AFC4-6F175D3DCCD1}">
-              <a14:hiddenFill xmlns="" xmlns:a14="http://schemas.microsoft.com/office/drawing/2010/main">
+              <a14:hiddenFill xmlns:a14="http://schemas.microsoft.com/office/drawing/2010/main" xmlns="">
                 <a:solidFill>
                   <a:srgbClr val="FFFFFF"/>
                 </a:solidFill>
               </a14:hiddenFill>
             </a:ext>
             <a:ext uri="{91240B29-F687-4f45-9708-019B960494DF}">
-              <a14:hiddenLine xmlns="" xmlns:a14="http://schemas.microsoft.com/office/drawing/2010/main" w="9525">
+              <a14:hiddenLine xmlns:a14="http://schemas.microsoft.com/office/drawing/2010/main" xmlns="" w="9525">
                 <a:solidFill>
                   <a:srgbClr val="000000"/>
                 </a:solidFill>
@@ -31697,8 +31188,20 @@
               <a:buChar char="•"/>
             </a:pPr>
             <a:r>
-              <a:rPr lang="de-CH" b="1"/>
-              <a:t>OneVsRest Multiclass Image Classification Problem</a:t>
+              <a:rPr lang="de-CH" b="1" dirty="0" err="1"/>
+              <a:t>OneVsRest</a:t>
+            </a:r>
+            <a:r>
+              <a:rPr lang="de-CH" b="1" dirty="0"/>
+              <a:t> </a:t>
+            </a:r>
+            <a:r>
+              <a:rPr lang="de-CH" b="1" dirty="0" err="1"/>
+              <a:t>Multiclass</a:t>
+            </a:r>
+            <a:r>
+              <a:rPr lang="de-CH" b="1" dirty="0"/>
+              <a:t> Image Classification Problem</a:t>
             </a:r>
           </a:p>
           <a:p>
@@ -31706,8 +31209,164 @@
               <a:buNone/>
             </a:pPr>
             <a:r>
-              <a:rPr lang="de-CH"/>
-              <a:t>Classified manually annotated 16.000 images downloaded from Flickr using Linux-on-Windows into one of the following 4 attributes (+ their antonyms + UNK classes) taking the argmax probability : </a:t>
+              <a:rPr lang="de-CH" dirty="0" err="1"/>
+              <a:t>Classified</a:t>
+            </a:r>
+            <a:r>
+              <a:rPr lang="de-CH" dirty="0"/>
+              <a:t> </a:t>
+            </a:r>
+            <a:r>
+              <a:rPr lang="de-CH" dirty="0" err="1"/>
+              <a:t>manually</a:t>
+            </a:r>
+            <a:r>
+              <a:rPr lang="de-CH" dirty="0"/>
+              <a:t> </a:t>
+            </a:r>
+            <a:r>
+              <a:rPr lang="de-CH" dirty="0" err="1"/>
+              <a:t>annotated</a:t>
+            </a:r>
+            <a:r>
+              <a:rPr lang="de-CH" dirty="0"/>
+              <a:t> </a:t>
+            </a:r>
+            <a:r>
+              <a:rPr lang="de-CH" dirty="0" err="1"/>
+              <a:t>images</a:t>
+            </a:r>
+            <a:r>
+              <a:rPr lang="de-CH" dirty="0"/>
+              <a:t> </a:t>
+            </a:r>
+            <a:r>
+              <a:rPr lang="de-CH" dirty="0" err="1"/>
+              <a:t>downloaded</a:t>
+            </a:r>
+            <a:r>
+              <a:rPr lang="de-CH" dirty="0"/>
+              <a:t> </a:t>
+            </a:r>
+            <a:r>
+              <a:rPr lang="de-CH" dirty="0" err="1"/>
+              <a:t>from</a:t>
+            </a:r>
+            <a:r>
+              <a:rPr lang="de-CH" dirty="0"/>
+              <a:t> Flickr </a:t>
+            </a:r>
+            <a:r>
+              <a:rPr lang="de-CH" dirty="0" err="1"/>
+              <a:t>using</a:t>
+            </a:r>
+            <a:r>
+              <a:rPr lang="de-CH" dirty="0"/>
+              <a:t> Linux-on-Windows </a:t>
+            </a:r>
+            <a:r>
+              <a:rPr lang="de-CH" dirty="0" err="1"/>
+              <a:t>into</a:t>
+            </a:r>
+            <a:r>
+              <a:rPr lang="de-CH" dirty="0"/>
+              <a:t> </a:t>
+            </a:r>
+            <a:r>
+              <a:rPr lang="de-CH" dirty="0" err="1"/>
+              <a:t>one</a:t>
+            </a:r>
+            <a:r>
+              <a:rPr lang="de-CH" dirty="0"/>
+              <a:t> </a:t>
+            </a:r>
+            <a:r>
+              <a:rPr lang="de-CH" dirty="0" err="1"/>
+              <a:t>of</a:t>
+            </a:r>
+            <a:r>
+              <a:rPr lang="de-CH" dirty="0"/>
+              <a:t> </a:t>
+            </a:r>
+            <a:r>
+              <a:rPr lang="de-CH" dirty="0" err="1"/>
+              <a:t>the</a:t>
+            </a:r>
+            <a:r>
+              <a:rPr lang="de-CH" dirty="0"/>
+              <a:t> </a:t>
+            </a:r>
+            <a:r>
+              <a:rPr lang="de-CH" dirty="0" err="1"/>
+              <a:t>following</a:t>
+            </a:r>
+            <a:r>
+              <a:rPr lang="de-CH" dirty="0"/>
+              <a:t> 4 </a:t>
+            </a:r>
+            <a:r>
+              <a:rPr lang="de-CH" dirty="0" err="1"/>
+              <a:t>attributes</a:t>
+            </a:r>
+            <a:r>
+              <a:rPr lang="de-CH" dirty="0"/>
+              <a:t> (+ </a:t>
+            </a:r>
+            <a:r>
+              <a:rPr lang="de-CH" dirty="0" err="1"/>
+              <a:t>their</a:t>
+            </a:r>
+            <a:r>
+              <a:rPr lang="de-CH" dirty="0"/>
+              <a:t> </a:t>
+            </a:r>
+            <a:r>
+              <a:rPr lang="de-CH" dirty="0" err="1"/>
+              <a:t>antonyms</a:t>
+            </a:r>
+            <a:r>
+              <a:rPr lang="de-CH" dirty="0"/>
+              <a:t> + UNK </a:t>
+            </a:r>
+            <a:r>
+              <a:rPr lang="de-CH" dirty="0" err="1"/>
+              <a:t>classes</a:t>
+            </a:r>
+            <a:r>
+              <a:rPr lang="de-CH" dirty="0"/>
+              <a:t>) </a:t>
+            </a:r>
+            <a:r>
+              <a:rPr lang="de-CH" dirty="0" err="1"/>
+              <a:t>taking</a:t>
+            </a:r>
+            <a:r>
+              <a:rPr lang="de-CH" dirty="0"/>
+              <a:t> </a:t>
+            </a:r>
+            <a:r>
+              <a:rPr lang="de-CH" dirty="0" err="1"/>
+              <a:t>the</a:t>
+            </a:r>
+            <a:r>
+              <a:rPr lang="de-CH" dirty="0"/>
+              <a:t> </a:t>
+            </a:r>
+            <a:r>
+              <a:rPr lang="de-CH" dirty="0" err="1"/>
+              <a:t>argmax</a:t>
+            </a:r>
+            <a:r>
+              <a:rPr lang="de-CH" dirty="0"/>
+              <a:t> </a:t>
+            </a:r>
+            <a:r>
+              <a:rPr lang="de-CH" dirty="0" err="1"/>
+              <a:t>probability</a:t>
+            </a:r>
+            <a:r>
+              <a:rPr lang="de-CH" dirty="0"/>
+              <a:t> : </a:t>
             </a:r>
           </a:p>
           <a:p>
@@ -31716,7 +31375,7 @@
               <a:buChar char="•"/>
             </a:pPr>
             <a:r>
-              <a:rPr lang="de-CH" b="1"/>
+              <a:rPr lang="de-CH" b="1" dirty="0"/>
               <a:t>Transfer Learning Approach</a:t>
             </a:r>
           </a:p>
@@ -31725,8 +31384,84 @@
               <a:buNone/>
             </a:pPr>
             <a:r>
-              <a:rPr lang="de-CH"/>
-              <a:t>Used pre-trained «ResNet50» model (CNN) with 500k parameters and added our own last fully connected classifier layer.</a:t>
+              <a:rPr lang="de-CH" dirty="0" err="1"/>
+              <a:t>Used</a:t>
+            </a:r>
+            <a:r>
+              <a:rPr lang="de-CH" dirty="0"/>
+              <a:t> </a:t>
+            </a:r>
+            <a:r>
+              <a:rPr lang="de-CH" dirty="0" err="1"/>
+              <a:t>pre-trained</a:t>
+            </a:r>
+            <a:r>
+              <a:rPr lang="de-CH" dirty="0"/>
+              <a:t> «ResNet50» </a:t>
+            </a:r>
+            <a:r>
+              <a:rPr lang="de-CH" dirty="0" err="1"/>
+              <a:t>model</a:t>
+            </a:r>
+            <a:r>
+              <a:rPr lang="de-CH" dirty="0"/>
+              <a:t> (CNN) </a:t>
+            </a:r>
+            <a:r>
+              <a:rPr lang="de-CH" dirty="0" err="1"/>
+              <a:t>with</a:t>
+            </a:r>
+            <a:r>
+              <a:rPr lang="de-CH" dirty="0"/>
+              <a:t> 500k </a:t>
+            </a:r>
+            <a:r>
+              <a:rPr lang="de-CH" dirty="0" err="1"/>
+              <a:t>parameters</a:t>
+            </a:r>
+            <a:r>
+              <a:rPr lang="de-CH" dirty="0"/>
+              <a:t> and </a:t>
+            </a:r>
+            <a:r>
+              <a:rPr lang="de-CH" dirty="0" err="1"/>
+              <a:t>added</a:t>
+            </a:r>
+            <a:r>
+              <a:rPr lang="de-CH" dirty="0"/>
+              <a:t> </a:t>
+            </a:r>
+            <a:r>
+              <a:rPr lang="de-CH" dirty="0" err="1"/>
+              <a:t>our</a:t>
+            </a:r>
+            <a:r>
+              <a:rPr lang="de-CH" dirty="0"/>
+              <a:t> own last fully </a:t>
+            </a:r>
+            <a:r>
+              <a:rPr lang="de-CH" dirty="0" err="1"/>
+              <a:t>connected</a:t>
+            </a:r>
+            <a:r>
+              <a:rPr lang="de-CH" dirty="0"/>
+              <a:t> </a:t>
+            </a:r>
+            <a:r>
+              <a:rPr lang="de-CH" dirty="0" err="1"/>
+              <a:t>classifier</a:t>
+            </a:r>
+            <a:r>
+              <a:rPr lang="de-CH" dirty="0"/>
+              <a:t> </a:t>
+            </a:r>
+            <a:r>
+              <a:rPr lang="de-CH" dirty="0" err="1"/>
+              <a:t>layer</a:t>
+            </a:r>
+            <a:r>
+              <a:rPr lang="de-CH" dirty="0"/>
+              <a:t>.</a:t>
             </a:r>
           </a:p>
           <a:p>
@@ -31735,18 +31470,66 @@
               <a:buChar char="•"/>
             </a:pPr>
             <a:r>
-              <a:rPr lang="de-CH" b="1"/>
-              <a:t>Model Prediction</a:t>
-            </a:r>
-            <a:endParaRPr lang="de-CH"/>
+              <a:rPr lang="de-CH" b="1" dirty="0"/>
+              <a:t>Model </a:t>
+            </a:r>
+            <a:r>
+              <a:rPr lang="de-CH" b="1" dirty="0" err="1"/>
+              <a:t>Prediction</a:t>
+            </a:r>
+            <a:endParaRPr lang="de-CH" dirty="0"/>
           </a:p>
           <a:p>
             <a:pPr marL="0" indent="0">
               <a:buNone/>
             </a:pPr>
             <a:r>
-              <a:rPr lang="de-CH"/>
-              <a:t>Predicted class label for brand images.</a:t>
+              <a:rPr lang="de-CH" dirty="0" err="1"/>
+              <a:t>Predicted</a:t>
+            </a:r>
+            <a:r>
+              <a:rPr lang="de-CH" dirty="0"/>
+              <a:t> </a:t>
+            </a:r>
+            <a:r>
+              <a:rPr lang="de-CH" dirty="0" err="1"/>
+              <a:t>class</a:t>
+            </a:r>
+            <a:r>
+              <a:rPr lang="de-CH" dirty="0"/>
+              <a:t> </a:t>
+            </a:r>
+            <a:r>
+              <a:rPr lang="de-CH" dirty="0" err="1"/>
+              <a:t>label</a:t>
+            </a:r>
+            <a:r>
+              <a:rPr lang="de-CH" dirty="0"/>
+              <a:t> </a:t>
+            </a:r>
+            <a:r>
+              <a:rPr lang="de-CH" dirty="0" err="1"/>
+              <a:t>for</a:t>
+            </a:r>
+            <a:r>
+              <a:rPr lang="de-CH" dirty="0"/>
+              <a:t> </a:t>
+            </a:r>
+            <a:r>
+              <a:rPr lang="de-CH" dirty="0" err="1"/>
+              <a:t>brand</a:t>
+            </a:r>
+            <a:r>
+              <a:rPr lang="de-CH" dirty="0"/>
+              <a:t> </a:t>
+            </a:r>
+            <a:r>
+              <a:rPr lang="de-CH" dirty="0" err="1"/>
+              <a:t>images</a:t>
+            </a:r>
+            <a:r>
+              <a:rPr lang="de-CH" dirty="0"/>
+              <a:t>.</a:t>
             </a:r>
           </a:p>
           <a:p>
@@ -31754,8 +31537,12 @@
               <a:buNone/>
             </a:pPr>
             <a:r>
-              <a:rPr lang="de-CH"/>
-              <a:t>Example: Brand «DAR-VIDA» </a:t>
+              <a:rPr lang="de-CH" dirty="0" err="1"/>
+              <a:t>Example</a:t>
+            </a:r>
+            <a:r>
+              <a:rPr lang="de-CH" dirty="0"/>
+              <a:t>: Brand «DAR-VIDA» </a:t>
             </a:r>
           </a:p>
         </p:txBody>
@@ -31955,7 +31742,7 @@
           <a:effectLst/>
           <a:extLst>
             <a:ext uri="{AF507438-7753-43e0-B8FC-AC1667EBCBE1}">
-              <a14:hiddenEffects xmlns="" xmlns:a14="http://schemas.microsoft.com/office/drawing/2010/main">
+              <a14:hiddenEffects xmlns:a14="http://schemas.microsoft.com/office/drawing/2010/main" xmlns="">
                 <a:effectLst>
                   <a:outerShdw blurRad="63500" dist="38099" dir="2700000" algn="ctr" rotWithShape="0">
                     <a:schemeClr val="bg2">
@@ -32082,14 +31869,14 @@
           <a:noFill/>
           <a:extLst>
             <a:ext uri="{909E8E84-426E-40dd-AFC4-6F175D3DCCD1}">
-              <a14:hiddenFill xmlns="" xmlns:a14="http://schemas.microsoft.com/office/drawing/2010/main">
+              <a14:hiddenFill xmlns:a14="http://schemas.microsoft.com/office/drawing/2010/main" xmlns="">
                 <a:solidFill>
                   <a:srgbClr val="FFFFFF"/>
                 </a:solidFill>
               </a14:hiddenFill>
             </a:ext>
             <a:ext uri="{91240B29-F687-4f45-9708-019B960494DF}">
-              <a14:hiddenLine xmlns="" xmlns:a14="http://schemas.microsoft.com/office/drawing/2010/main" w="9525">
+              <a14:hiddenLine xmlns:a14="http://schemas.microsoft.com/office/drawing/2010/main" xmlns="" w="9525">
                 <a:solidFill>
                   <a:srgbClr val="000000"/>
                 </a:solidFill>
@@ -32099,7 +31886,7 @@
               </a14:hiddenLine>
             </a:ext>
             <a:ext uri="{FAA26D3D-D897-4be2-8F04-BA451C77F1D7}">
-              <ma14:placeholderFlag xmlns="" xmlns:ma14="http://schemas.microsoft.com/office/mac/drawingml/2011/main" val="1"/>
+              <ma14:placeholderFlag xmlns:ma14="http://schemas.microsoft.com/office/mac/drawingml/2011/main" xmlns="" val="1"/>
             </a:ext>
           </a:extLst>
         </p:spPr>
@@ -32416,14 +32203,14 @@
           <a:noFill/>
           <a:extLst>
             <a:ext uri="{909E8E84-426E-40dd-AFC4-6F175D3DCCD1}">
-              <a14:hiddenFill xmlns="" xmlns:a14="http://schemas.microsoft.com/office/drawing/2010/main">
+              <a14:hiddenFill xmlns:a14="http://schemas.microsoft.com/office/drawing/2010/main" xmlns="">
                 <a:solidFill>
                   <a:srgbClr val="FFFFFF"/>
                 </a:solidFill>
               </a14:hiddenFill>
             </a:ext>
             <a:ext uri="{91240B29-F687-4f45-9708-019B960494DF}">
-              <a14:hiddenLine xmlns="" xmlns:a14="http://schemas.microsoft.com/office/drawing/2010/main" w="9525">
+              <a14:hiddenLine xmlns:a14="http://schemas.microsoft.com/office/drawing/2010/main" xmlns="" w="9525">
                 <a:solidFill>
                   <a:srgbClr val="000000"/>
                 </a:solidFill>
@@ -32582,7 +32369,7 @@
           <a:effectLst/>
           <a:extLst>
             <a:ext uri="{AF507438-7753-43e0-B8FC-AC1667EBCBE1}">
-              <a14:hiddenEffects xmlns="" xmlns:a14="http://schemas.microsoft.com/office/drawing/2010/main">
+              <a14:hiddenEffects xmlns:a14="http://schemas.microsoft.com/office/drawing/2010/main" xmlns="">
                 <a:effectLst>
                   <a:outerShdw blurRad="63500" dist="38099" dir="2700000" algn="ctr" rotWithShape="0">
                     <a:schemeClr val="bg2">
@@ -32735,7 +32522,7 @@
           <a:effectLst/>
           <a:extLst>
             <a:ext uri="{AF507438-7753-43e0-B8FC-AC1667EBCBE1}">
-              <a14:hiddenEffects xmlns="" xmlns:a14="http://schemas.microsoft.com/office/drawing/2010/main">
+              <a14:hiddenEffects xmlns:a14="http://schemas.microsoft.com/office/drawing/2010/main" xmlns="">
                 <a:effectLst>
                   <a:outerShdw blurRad="63500" dist="38099" dir="2700000" algn="ctr" rotWithShape="0">
                     <a:schemeClr val="bg2">
@@ -32826,7 +32613,7 @@
           <a:effectLst/>
           <a:extLst>
             <a:ext uri="{AF507438-7753-43e0-B8FC-AC1667EBCBE1}">
-              <a14:hiddenEffects xmlns="" xmlns:a14="http://schemas.microsoft.com/office/drawing/2010/main">
+              <a14:hiddenEffects xmlns:a14="http://schemas.microsoft.com/office/drawing/2010/main" xmlns="">
                 <a:effectLst>
                   <a:outerShdw blurRad="63500" dist="38099" dir="2700000" algn="ctr" rotWithShape="0">
                     <a:schemeClr val="bg2">
@@ -32917,7 +32704,7 @@
           <a:effectLst/>
           <a:extLst>
             <a:ext uri="{AF507438-7753-43e0-B8FC-AC1667EBCBE1}">
-              <a14:hiddenEffects xmlns="" xmlns:a14="http://schemas.microsoft.com/office/drawing/2010/main">
+              <a14:hiddenEffects xmlns:a14="http://schemas.microsoft.com/office/drawing/2010/main" xmlns="">
                 <a:effectLst>
                   <a:outerShdw blurRad="63500" dist="38099" dir="2700000" algn="ctr" rotWithShape="0">
                     <a:schemeClr val="bg2">
@@ -33008,7 +32795,7 @@
           <a:effectLst/>
           <a:extLst>
             <a:ext uri="{AF507438-7753-43e0-B8FC-AC1667EBCBE1}">
-              <a14:hiddenEffects xmlns="" xmlns:a14="http://schemas.microsoft.com/office/drawing/2010/main">
+              <a14:hiddenEffects xmlns:a14="http://schemas.microsoft.com/office/drawing/2010/main" xmlns="">
                 <a:effectLst>
                   <a:outerShdw blurRad="63500" dist="38099" dir="2700000" algn="ctr" rotWithShape="0">
                     <a:schemeClr val="bg2">
@@ -33099,7 +32886,7 @@
           <a:effectLst/>
           <a:extLst>
             <a:ext uri="{AF507438-7753-43e0-B8FC-AC1667EBCBE1}">
-              <a14:hiddenEffects xmlns="" xmlns:a14="http://schemas.microsoft.com/office/drawing/2010/main">
+              <a14:hiddenEffects xmlns:a14="http://schemas.microsoft.com/office/drawing/2010/main" xmlns="">
                 <a:effectLst>
                   <a:outerShdw blurRad="63500" dist="38099" dir="2700000" algn="ctr" rotWithShape="0">
                     <a:schemeClr val="bg2">
@@ -33191,7 +32978,7 @@
           <a:effectLst/>
           <a:extLst>
             <a:ext uri="{AF507438-7753-43e0-B8FC-AC1667EBCBE1}">
-              <a14:hiddenEffects xmlns="" xmlns:a14="http://schemas.microsoft.com/office/drawing/2010/main">
+              <a14:hiddenEffects xmlns:a14="http://schemas.microsoft.com/office/drawing/2010/main" xmlns="">
                 <a:effectLst>
                   <a:outerShdw blurRad="63500" dist="38099" dir="2700000" algn="ctr" rotWithShape="0">
                     <a:schemeClr val="bg2">
@@ -33342,7 +33129,7 @@
           <a:effectLst/>
           <a:extLst>
             <a:ext uri="{AF507438-7753-43e0-B8FC-AC1667EBCBE1}">
-              <a14:hiddenEffects xmlns="" xmlns:a14="http://schemas.microsoft.com/office/drawing/2010/main">
+              <a14:hiddenEffects xmlns:a14="http://schemas.microsoft.com/office/drawing/2010/main" xmlns="">
                 <a:effectLst>
                   <a:outerShdw blurRad="63500" dist="38099" dir="2700000" algn="ctr" rotWithShape="0">
                     <a:schemeClr val="bg2">
@@ -33433,7 +33220,7 @@
           <a:effectLst/>
           <a:extLst>
             <a:ext uri="{AF507438-7753-43e0-B8FC-AC1667EBCBE1}">
-              <a14:hiddenEffects xmlns="" xmlns:a14="http://schemas.microsoft.com/office/drawing/2010/main">
+              <a14:hiddenEffects xmlns:a14="http://schemas.microsoft.com/office/drawing/2010/main" xmlns="">
                 <a:effectLst>
                   <a:outerShdw blurRad="63500" dist="38099" dir="2700000" algn="ctr" rotWithShape="0">
                     <a:schemeClr val="bg2">
@@ -33520,7 +33307,7 @@
           <a:effectLst/>
           <a:extLst>
             <a:ext uri="{AF507438-7753-43e0-B8FC-AC1667EBCBE1}">
-              <a14:hiddenEffects xmlns="" xmlns:a14="http://schemas.microsoft.com/office/drawing/2010/main">
+              <a14:hiddenEffects xmlns:a14="http://schemas.microsoft.com/office/drawing/2010/main" xmlns="">
                 <a:effectLst>
                   <a:outerShdw blurRad="63500" dist="38099" dir="2700000" algn="ctr" rotWithShape="0">
                     <a:schemeClr val="bg2">
@@ -33609,7 +33396,7 @@
           <a:effectLst/>
           <a:extLst>
             <a:ext uri="{AF507438-7753-43e0-B8FC-AC1667EBCBE1}">
-              <a14:hiddenEffects xmlns="" xmlns:a14="http://schemas.microsoft.com/office/drawing/2010/main">
+              <a14:hiddenEffects xmlns:a14="http://schemas.microsoft.com/office/drawing/2010/main" xmlns="">
                 <a:effectLst>
                   <a:outerShdw blurRad="63500" dist="38099" dir="2700000" algn="ctr" rotWithShape="0">
                     <a:schemeClr val="bg2">
@@ -33657,7 +33444,7 @@
           <a:effectLst/>
           <a:extLst>
             <a:ext uri="{AF507438-7753-43e0-B8FC-AC1667EBCBE1}">
-              <a14:hiddenEffects xmlns="" xmlns:a14="http://schemas.microsoft.com/office/drawing/2010/main">
+              <a14:hiddenEffects xmlns:a14="http://schemas.microsoft.com/office/drawing/2010/main" xmlns="">
                 <a:effectLst>
                   <a:outerShdw blurRad="63500" dist="38099" dir="2700000" algn="ctr" rotWithShape="0">
                     <a:schemeClr val="bg2">
@@ -33708,7 +33495,7 @@
           <a:effectLst/>
           <a:extLst>
             <a:ext uri="{AF507438-7753-43e0-B8FC-AC1667EBCBE1}">
-              <a14:hiddenEffects xmlns="" xmlns:a14="http://schemas.microsoft.com/office/drawing/2010/main">
+              <a14:hiddenEffects xmlns:a14="http://schemas.microsoft.com/office/drawing/2010/main" xmlns="">
                 <a:effectLst>
                   <a:outerShdw blurRad="63500" dist="38099" dir="2700000" algn="ctr" rotWithShape="0">
                     <a:schemeClr val="bg2">
@@ -33758,7 +33545,7 @@
           <a:effectLst/>
           <a:extLst>
             <a:ext uri="{AF507438-7753-43e0-B8FC-AC1667EBCBE1}">
-              <a14:hiddenEffects xmlns="" xmlns:a14="http://schemas.microsoft.com/office/drawing/2010/main">
+              <a14:hiddenEffects xmlns:a14="http://schemas.microsoft.com/office/drawing/2010/main" xmlns="">
                 <a:effectLst>
                   <a:outerShdw blurRad="63500" dist="38099" dir="2700000" algn="ctr" rotWithShape="0">
                     <a:schemeClr val="bg2">
@@ -33808,7 +33595,7 @@
           <a:effectLst/>
           <a:extLst>
             <a:ext uri="{AF507438-7753-43e0-B8FC-AC1667EBCBE1}">
-              <a14:hiddenEffects xmlns="" xmlns:a14="http://schemas.microsoft.com/office/drawing/2010/main">
+              <a14:hiddenEffects xmlns:a14="http://schemas.microsoft.com/office/drawing/2010/main" xmlns="">
                 <a:effectLst>
                   <a:outerShdw blurRad="63500" dist="38099" dir="2700000" algn="ctr" rotWithShape="0">
                     <a:schemeClr val="bg2">
@@ -33859,7 +33646,7 @@
           <a:effectLst/>
           <a:extLst>
             <a:ext uri="{AF507438-7753-43e0-B8FC-AC1667EBCBE1}">
-              <a14:hiddenEffects xmlns="" xmlns:a14="http://schemas.microsoft.com/office/drawing/2010/main">
+              <a14:hiddenEffects xmlns:a14="http://schemas.microsoft.com/office/drawing/2010/main" xmlns="">
                 <a:effectLst>
                   <a:outerShdw blurRad="63500" dist="38099" dir="2700000" algn="ctr" rotWithShape="0">
                     <a:schemeClr val="bg2">
@@ -33910,7 +33697,7 @@
           <a:effectLst/>
           <a:extLst>
             <a:ext uri="{AF507438-7753-43e0-B8FC-AC1667EBCBE1}">
-              <a14:hiddenEffects xmlns="" xmlns:a14="http://schemas.microsoft.com/office/drawing/2010/main">
+              <a14:hiddenEffects xmlns:a14="http://schemas.microsoft.com/office/drawing/2010/main" xmlns="">
                 <a:effectLst>
                   <a:outerShdw blurRad="63500" dist="38099" dir="2700000" algn="ctr" rotWithShape="0">
                     <a:schemeClr val="bg2">
@@ -33958,7 +33745,7 @@
           <a:effectLst/>
           <a:extLst>
             <a:ext uri="{AF507438-7753-43e0-B8FC-AC1667EBCBE1}">
-              <a14:hiddenEffects xmlns="" xmlns:a14="http://schemas.microsoft.com/office/drawing/2010/main">
+              <a14:hiddenEffects xmlns:a14="http://schemas.microsoft.com/office/drawing/2010/main" xmlns="">
                 <a:effectLst>
                   <a:outerShdw blurRad="63500" dist="38099" dir="2700000" algn="ctr" rotWithShape="0">
                     <a:schemeClr val="bg2">
@@ -34045,7 +33832,7 @@
           <a:effectLst/>
           <a:extLst>
             <a:ext uri="{AF507438-7753-43e0-B8FC-AC1667EBCBE1}">
-              <a14:hiddenEffects xmlns="" xmlns:a14="http://schemas.microsoft.com/office/drawing/2010/main">
+              <a14:hiddenEffects xmlns:a14="http://schemas.microsoft.com/office/drawing/2010/main" xmlns="">
                 <a:effectLst>
                   <a:outerShdw blurRad="63500" dist="38099" dir="2700000" algn="ctr" rotWithShape="0">
                     <a:schemeClr val="bg2">
@@ -34134,7 +33921,7 @@
           <a:effectLst/>
           <a:extLst>
             <a:ext uri="{AF507438-7753-43e0-B8FC-AC1667EBCBE1}">
-              <a14:hiddenEffects xmlns="" xmlns:a14="http://schemas.microsoft.com/office/drawing/2010/main">
+              <a14:hiddenEffects xmlns:a14="http://schemas.microsoft.com/office/drawing/2010/main" xmlns="">
                 <a:effectLst>
                   <a:outerShdw blurRad="63500" dist="38099" dir="2700000" algn="ctr" rotWithShape="0">
                     <a:schemeClr val="bg2">
@@ -34495,7 +34282,7 @@
           <a:effectLst/>
           <a:extLst>
             <a:ext uri="{AF507438-7753-43e0-B8FC-AC1667EBCBE1}">
-              <a14:hiddenEffects xmlns="" xmlns:a14="http://schemas.microsoft.com/office/drawing/2010/main">
+              <a14:hiddenEffects xmlns:a14="http://schemas.microsoft.com/office/drawing/2010/main" xmlns="">
                 <a:effectLst>
                   <a:outerShdw blurRad="63500" dist="38099" dir="2700000" algn="ctr" rotWithShape="0">
                     <a:schemeClr val="bg2">
@@ -34630,14 +34417,14 @@
           <a:noFill/>
           <a:extLst>
             <a:ext uri="{909E8E84-426E-40dd-AFC4-6F175D3DCCD1}">
-              <a14:hiddenFill xmlns="" xmlns:a14="http://schemas.microsoft.com/office/drawing/2010/main">
+              <a14:hiddenFill xmlns:a14="http://schemas.microsoft.com/office/drawing/2010/main" xmlns="">
                 <a:solidFill>
                   <a:srgbClr val="FFFFFF"/>
                 </a:solidFill>
               </a14:hiddenFill>
             </a:ext>
             <a:ext uri="{91240B29-F687-4f45-9708-019B960494DF}">
-              <a14:hiddenLine xmlns="" xmlns:a14="http://schemas.microsoft.com/office/drawing/2010/main" w="9525">
+              <a14:hiddenLine xmlns:a14="http://schemas.microsoft.com/office/drawing/2010/main" xmlns="" w="9525">
                 <a:solidFill>
                   <a:srgbClr val="000000"/>
                 </a:solidFill>
@@ -34647,7 +34434,7 @@
               </a14:hiddenLine>
             </a:ext>
             <a:ext uri="{FAA26D3D-D897-4be2-8F04-BA451C77F1D7}">
-              <ma14:placeholderFlag xmlns="" xmlns:ma14="http://schemas.microsoft.com/office/mac/drawingml/2011/main" val="1"/>
+              <ma14:placeholderFlag xmlns:ma14="http://schemas.microsoft.com/office/mac/drawingml/2011/main" xmlns="" val="1"/>
             </a:ext>
           </a:extLst>
         </p:spPr>
@@ -35127,14 +34914,14 @@
           <a:noFill/>
           <a:extLst>
             <a:ext uri="{909E8E84-426E-40dd-AFC4-6F175D3DCCD1}">
-              <a14:hiddenFill xmlns="" xmlns:a14="http://schemas.microsoft.com/office/drawing/2010/main">
+              <a14:hiddenFill xmlns:a14="http://schemas.microsoft.com/office/drawing/2010/main" xmlns="">
                 <a:solidFill>
                   <a:srgbClr val="FFFFFF"/>
                 </a:solidFill>
               </a14:hiddenFill>
             </a:ext>
             <a:ext uri="{91240B29-F687-4f45-9708-019B960494DF}">
-              <a14:hiddenLine xmlns="" xmlns:a14="http://schemas.microsoft.com/office/drawing/2010/main" w="9525">
+              <a14:hiddenLine xmlns:a14="http://schemas.microsoft.com/office/drawing/2010/main" xmlns="" w="9525">
                 <a:solidFill>
                   <a:srgbClr val="000000"/>
                 </a:solidFill>
@@ -35144,7 +34931,7 @@
               </a14:hiddenLine>
             </a:ext>
             <a:ext uri="{FAA26D3D-D897-4be2-8F04-BA451C77F1D7}">
-              <ma14:placeholderFlag xmlns="" xmlns:ma14="http://schemas.microsoft.com/office/mac/drawingml/2011/main" val="1"/>
+              <ma14:placeholderFlag xmlns:ma14="http://schemas.microsoft.com/office/mac/drawingml/2011/main" xmlns="" val="1"/>
             </a:ext>
           </a:extLst>
         </p:spPr>
@@ -35221,7 +35008,7 @@
         <p:spPr>
           <a:xfrm>
             <a:off x="395344" y="1236078"/>
-            <a:ext cx="9118241" cy="4628321"/>
+            <a:ext cx="9118241" cy="5424662"/>
           </a:xfrm>
         </p:spPr>
         <p:txBody>
@@ -35243,10 +35030,6 @@
               <a:rPr lang="de-CH" b="1" dirty="0" err="1"/>
               <a:t>collection</a:t>
             </a:r>
-            <a:r>
-              <a:rPr lang="de-CH" b="1" dirty="0"/>
-              <a:t/>
-            </a:r>
             <a:br>
               <a:rPr lang="de-CH" b="1" dirty="0"/>
             </a:br>
@@ -35376,10 +35159,6 @@
               <a:rPr lang="de-CH" b="1" dirty="0" err="1"/>
               <a:t>selection</a:t>
             </a:r>
-            <a:r>
-              <a:rPr lang="de-CH" b="1" dirty="0"/>
-              <a:t/>
-            </a:r>
             <a:br>
               <a:rPr lang="de-CH" b="1" dirty="0"/>
             </a:br>
@@ -35433,10 +35212,6 @@
               <a:rPr lang="de-CH" b="1" dirty="0" err="1"/>
               <a:t>copyright</a:t>
             </a:r>
-            <a:r>
-              <a:rPr lang="de-CH" b="1" dirty="0"/>
-              <a:t/>
-            </a:r>
             <a:br>
               <a:rPr lang="de-CH" b="1" dirty="0"/>
             </a:br>
@@ -35506,11 +35281,255 @@
             </a:br>
             <a:r>
               <a:rPr lang="de-CH" b="1" dirty="0"/>
-              <a:t>@</a:t>
+              <a:t>Hyper-Parameter Tuning </a:t>
             </a:r>
             <a:r>
               <a:rPr lang="de-CH" b="1" dirty="0" err="1"/>
-              <a:t>Neeraj</a:t>
+              <a:t>to</a:t>
+            </a:r>
+            <a:r>
+              <a:rPr lang="de-CH" b="1" dirty="0"/>
+              <a:t> find out </a:t>
+            </a:r>
+            <a:r>
+              <a:rPr lang="de-CH" b="1" dirty="0" err="1"/>
+              <a:t>the</a:t>
+            </a:r>
+            <a:r>
+              <a:rPr lang="de-CH" b="1" dirty="0"/>
+              <a:t> </a:t>
+            </a:r>
+            <a:r>
+              <a:rPr lang="de-CH" b="1" dirty="0" err="1"/>
+              <a:t>best</a:t>
+            </a:r>
+            <a:r>
+              <a:rPr lang="de-CH" b="1" dirty="0"/>
+              <a:t> </a:t>
+            </a:r>
+            <a:r>
+              <a:rPr lang="de-CH" b="1" dirty="0" err="1"/>
+              <a:t>parameters</a:t>
+            </a:r>
+            <a:r>
+              <a:rPr lang="de-CH" b="1" dirty="0"/>
+              <a:t> </a:t>
+            </a:r>
+            <a:r>
+              <a:rPr lang="de-CH" b="1" dirty="0" err="1"/>
+              <a:t>for</a:t>
+            </a:r>
+            <a:r>
+              <a:rPr lang="de-CH" b="1" dirty="0"/>
+              <a:t> </a:t>
+            </a:r>
+            <a:r>
+              <a:rPr lang="de-CH" b="1" dirty="0" err="1"/>
+              <a:t>the</a:t>
+            </a:r>
+            <a:r>
+              <a:rPr lang="de-CH" b="1" dirty="0"/>
+              <a:t> </a:t>
+            </a:r>
+            <a:r>
+              <a:rPr lang="de-CH" b="1" dirty="0" err="1"/>
+              <a:t>models</a:t>
+            </a:r>
+            <a:r>
+              <a:rPr lang="de-CH" b="1" dirty="0"/>
+              <a:t>, </a:t>
+            </a:r>
+            <a:r>
+              <a:rPr lang="de-CH" b="1" dirty="0" err="1"/>
+              <a:t>i.e</a:t>
+            </a:r>
+            <a:r>
+              <a:rPr lang="de-CH" b="1" dirty="0"/>
+              <a:t> Optimizer, Loss </a:t>
+            </a:r>
+            <a:r>
+              <a:rPr lang="de-CH" b="1" dirty="0" err="1"/>
+              <a:t>Function</a:t>
+            </a:r>
+            <a:r>
+              <a:rPr lang="de-CH" b="1" dirty="0"/>
+              <a:t>, Numbers </a:t>
+            </a:r>
+            <a:r>
+              <a:rPr lang="de-CH" b="1" dirty="0" err="1"/>
+              <a:t>of</a:t>
+            </a:r>
+            <a:r>
+              <a:rPr lang="de-CH" b="1" dirty="0"/>
+              <a:t> </a:t>
+            </a:r>
+            <a:r>
+              <a:rPr lang="de-CH" b="1" dirty="0" err="1"/>
+              <a:t>layers</a:t>
+            </a:r>
+            <a:r>
+              <a:rPr lang="de-CH" b="1" dirty="0"/>
+              <a:t> </a:t>
+            </a:r>
+            <a:r>
+              <a:rPr lang="de-CH" b="1" dirty="0" err="1"/>
+              <a:t>to</a:t>
+            </a:r>
+            <a:r>
+              <a:rPr lang="de-CH" b="1" dirty="0"/>
+              <a:t> </a:t>
+            </a:r>
+            <a:r>
+              <a:rPr lang="de-CH" b="1" dirty="0" err="1"/>
+              <a:t>fine</a:t>
+            </a:r>
+            <a:r>
+              <a:rPr lang="de-CH" b="1" dirty="0"/>
+              <a:t> tune. </a:t>
+            </a:r>
+          </a:p>
+          <a:p>
+            <a:pPr marL="0" indent="0">
+              <a:lnSpc>
+                <a:spcPct val="100000"/>
+              </a:lnSpc>
+              <a:buNone/>
+            </a:pPr>
+            <a:r>
+              <a:rPr lang="de-CH" b="1" dirty="0"/>
+              <a:t>       Multilabel Classification : </a:t>
+            </a:r>
+            <a:r>
+              <a:rPr lang="de-CH" b="1" dirty="0" err="1"/>
+              <a:t>Associating</a:t>
+            </a:r>
+            <a:r>
+              <a:rPr lang="de-CH" b="1" dirty="0"/>
+              <a:t> an </a:t>
+            </a:r>
+            <a:r>
+              <a:rPr lang="de-CH" b="1" dirty="0" err="1"/>
+              <a:t>image</a:t>
+            </a:r>
+            <a:r>
+              <a:rPr lang="de-CH" b="1" dirty="0"/>
+              <a:t> </a:t>
+            </a:r>
+            <a:r>
+              <a:rPr lang="de-CH" b="1" dirty="0" err="1"/>
+              <a:t>with</a:t>
+            </a:r>
+            <a:r>
+              <a:rPr lang="de-CH" b="1" dirty="0"/>
+              <a:t> multiple </a:t>
+            </a:r>
+            <a:r>
+              <a:rPr lang="de-CH" b="1" dirty="0" err="1"/>
+              <a:t>attributes</a:t>
+            </a:r>
+            <a:r>
+              <a:rPr lang="de-CH" b="1" dirty="0"/>
+              <a:t>, </a:t>
+            </a:r>
+            <a:r>
+              <a:rPr lang="de-CH" b="1" dirty="0" err="1"/>
+              <a:t>inseatd</a:t>
+            </a:r>
+            <a:r>
+              <a:rPr lang="de-CH" b="1" dirty="0"/>
+              <a:t> </a:t>
+            </a:r>
+            <a:r>
+              <a:rPr lang="de-CH" b="1" dirty="0" err="1"/>
+              <a:t>of</a:t>
+            </a:r>
+            <a:r>
+              <a:rPr lang="de-CH" b="1" dirty="0"/>
+              <a:t> </a:t>
+            </a:r>
+            <a:r>
+              <a:rPr lang="de-CH" b="1" dirty="0" err="1"/>
+              <a:t>single</a:t>
+            </a:r>
+            <a:r>
+              <a:rPr lang="de-CH" b="1" dirty="0"/>
+              <a:t> 	</a:t>
+            </a:r>
+            <a:r>
+              <a:rPr lang="de-CH" b="1" dirty="0" err="1"/>
+              <a:t>attribute</a:t>
+            </a:r>
+            <a:r>
+              <a:rPr lang="de-CH" b="1" dirty="0"/>
+              <a:t>. </a:t>
+            </a:r>
+          </a:p>
+          <a:p>
+            <a:pPr marL="285750" indent="-285750">
+              <a:lnSpc>
+                <a:spcPct val="100000"/>
+              </a:lnSpc>
+              <a:buFont typeface="Arial" panose="020B0604020202020204" pitchFamily="34" charset="0"/>
+              <a:buChar char="•"/>
+            </a:pPr>
+            <a:r>
+              <a:rPr lang="de-CH" b="1" dirty="0"/>
+              <a:t>Web App</a:t>
+            </a:r>
+            <a:br>
+              <a:rPr lang="de-CH" b="1" dirty="0"/>
+            </a:br>
+            <a:r>
+              <a:rPr lang="de-CH" b="1" dirty="0" err="1"/>
+              <a:t>error</a:t>
+            </a:r>
+            <a:r>
+              <a:rPr lang="de-CH" b="1" dirty="0"/>
+              <a:t> </a:t>
+            </a:r>
+            <a:r>
+              <a:rPr lang="de-CH" b="1" dirty="0" err="1"/>
+              <a:t>handling</a:t>
+            </a:r>
+            <a:r>
+              <a:rPr lang="de-CH" b="1" dirty="0"/>
+              <a:t>, UI </a:t>
+            </a:r>
+            <a:r>
+              <a:rPr lang="de-CH" b="1" dirty="0" err="1"/>
+              <a:t>enhancements</a:t>
+            </a:r>
+            <a:r>
+              <a:rPr lang="de-CH" b="1" dirty="0"/>
+              <a:t>, </a:t>
+            </a:r>
+            <a:r>
+              <a:rPr lang="de-CH" b="1" dirty="0" err="1"/>
+              <a:t>database</a:t>
+            </a:r>
+            <a:r>
+              <a:rPr lang="de-CH" b="1" dirty="0"/>
+              <a:t> </a:t>
+            </a:r>
+            <a:r>
+              <a:rPr lang="de-CH" b="1" dirty="0" err="1"/>
+              <a:t>integration</a:t>
+            </a:r>
+            <a:r>
+              <a:rPr lang="de-CH" b="1" dirty="0"/>
+              <a:t>, </a:t>
+            </a:r>
+            <a:r>
+              <a:rPr lang="de-CH" b="1" dirty="0" err="1"/>
+              <a:t>image</a:t>
+            </a:r>
+            <a:r>
+              <a:rPr lang="de-CH" b="1" dirty="0"/>
+              <a:t> </a:t>
+            </a:r>
+            <a:r>
+              <a:rPr lang="de-CH" b="1" dirty="0" err="1"/>
+              <a:t>display</a:t>
             </a:r>
             <a:endParaRPr lang="de-CH" b="1" dirty="0"/>
           </a:p>
@@ -35523,81 +35542,8 @@
               <a:buChar char="•"/>
             </a:pPr>
             <a:r>
-              <a:rPr lang="de-CH" b="1" dirty="0"/>
-              <a:t>Web App</a:t>
-            </a:r>
-            <a:br>
-              <a:rPr lang="de-CH" b="1" dirty="0"/>
-            </a:br>
-            <a:r>
-              <a:rPr lang="de-CH" b="1" dirty="0" err="1"/>
-              <a:t>error</a:t>
-            </a:r>
-            <a:r>
-              <a:rPr lang="de-CH" b="1" dirty="0"/>
-              <a:t> </a:t>
-            </a:r>
-            <a:r>
-              <a:rPr lang="de-CH" b="1" dirty="0" err="1"/>
-              <a:t>handling</a:t>
-            </a:r>
-            <a:r>
-              <a:rPr lang="de-CH" b="1" dirty="0"/>
-              <a:t>, UI </a:t>
-            </a:r>
-            <a:r>
-              <a:rPr lang="de-CH" b="1" dirty="0" err="1"/>
-              <a:t>enhancements</a:t>
-            </a:r>
-            <a:r>
-              <a:rPr lang="de-CH" b="1" dirty="0"/>
-              <a:t>, </a:t>
-            </a:r>
-            <a:r>
-              <a:rPr lang="de-CH" b="1" dirty="0" err="1"/>
-              <a:t>database</a:t>
-            </a:r>
-            <a:r>
-              <a:rPr lang="de-CH" b="1" dirty="0"/>
-              <a:t> </a:t>
-            </a:r>
-            <a:r>
-              <a:rPr lang="de-CH" b="1" dirty="0" err="1"/>
-              <a:t>integration</a:t>
-            </a:r>
-            <a:r>
-              <a:rPr lang="de-CH" b="1" dirty="0"/>
-              <a:t>, </a:t>
-            </a:r>
-            <a:r>
-              <a:rPr lang="de-CH" b="1" dirty="0" err="1"/>
-              <a:t>image</a:t>
-            </a:r>
-            <a:r>
-              <a:rPr lang="de-CH" b="1" dirty="0"/>
-              <a:t> </a:t>
-            </a:r>
-            <a:r>
-              <a:rPr lang="de-CH" b="1" dirty="0" err="1"/>
-              <a:t>display</a:t>
-            </a:r>
-            <a:endParaRPr lang="de-CH" b="1" dirty="0"/>
-          </a:p>
-          <a:p>
-            <a:pPr marL="285750" indent="-285750">
-              <a:lnSpc>
-                <a:spcPct val="100000"/>
-              </a:lnSpc>
-              <a:buFont typeface="Arial" panose="020B0604020202020204" pitchFamily="34" charset="0"/>
-              <a:buChar char="•"/>
-            </a:pPr>
-            <a:r>
               <a:rPr lang="de-CH" b="1" dirty="0" err="1"/>
               <a:t>Deployment</a:t>
-            </a:r>
-            <a:r>
-              <a:rPr lang="de-CH" b="1" dirty="0"/>
-              <a:t/>
             </a:r>
             <a:br>
               <a:rPr lang="de-CH" b="1" dirty="0"/>
@@ -35715,14 +35661,14 @@
           <a:noFill/>
           <a:extLst>
             <a:ext uri="{909E8E84-426E-40dd-AFC4-6F175D3DCCD1}">
-              <a14:hiddenFill xmlns="" xmlns:a14="http://schemas.microsoft.com/office/drawing/2010/main">
+              <a14:hiddenFill xmlns:a14="http://schemas.microsoft.com/office/drawing/2010/main" xmlns="">
                 <a:solidFill>
                   <a:srgbClr val="FFFFFF"/>
                 </a:solidFill>
               </a14:hiddenFill>
             </a:ext>
             <a:ext uri="{91240B29-F687-4f45-9708-019B960494DF}">
-              <a14:hiddenLine xmlns="" xmlns:a14="http://schemas.microsoft.com/office/drawing/2010/main" w="9525">
+              <a14:hiddenLine xmlns:a14="http://schemas.microsoft.com/office/drawing/2010/main" xmlns="" w="9525">
                 <a:solidFill>
                   <a:srgbClr val="000000"/>
                 </a:solidFill>
@@ -35732,7 +35678,7 @@
               </a14:hiddenLine>
             </a:ext>
             <a:ext uri="{FAA26D3D-D897-4be2-8F04-BA451C77F1D7}">
-              <ma14:placeholderFlag xmlns="" xmlns:ma14="http://schemas.microsoft.com/office/mac/drawingml/2011/main" val="1"/>
+              <ma14:placeholderFlag xmlns:ma14="http://schemas.microsoft.com/office/mac/drawingml/2011/main" xmlns="" val="1"/>
             </a:ext>
           </a:extLst>
         </p:spPr>
@@ -35811,14 +35757,14 @@
           <a:noFill/>
           <a:extLst>
             <a:ext uri="{909E8E84-426E-40dd-AFC4-6F175D3DCCD1}">
-              <a14:hiddenFill xmlns="" xmlns:a14="http://schemas.microsoft.com/office/drawing/2010/main">
+              <a14:hiddenFill xmlns:a14="http://schemas.microsoft.com/office/drawing/2010/main" xmlns="">
                 <a:solidFill>
                   <a:srgbClr val="FFFFFF"/>
                 </a:solidFill>
               </a14:hiddenFill>
             </a:ext>
             <a:ext uri="{91240B29-F687-4f45-9708-019B960494DF}">
-              <a14:hiddenLine xmlns="" xmlns:a14="http://schemas.microsoft.com/office/drawing/2010/main" w="9525">
+              <a14:hiddenLine xmlns:a14="http://schemas.microsoft.com/office/drawing/2010/main" xmlns="" w="9525">
                 <a:solidFill>
                   <a:srgbClr val="000000"/>
                 </a:solidFill>
@@ -35901,14 +35847,14 @@
           <a:noFill/>
           <a:extLst>
             <a:ext uri="{909E8E84-426E-40dd-AFC4-6F175D3DCCD1}">
-              <a14:hiddenFill xmlns="" xmlns:a14="http://schemas.microsoft.com/office/drawing/2010/main">
+              <a14:hiddenFill xmlns:a14="http://schemas.microsoft.com/office/drawing/2010/main" xmlns="">
                 <a:solidFill>
                   <a:srgbClr val="FFFFFF"/>
                 </a:solidFill>
               </a14:hiddenFill>
             </a:ext>
             <a:ext uri="{91240B29-F687-4f45-9708-019B960494DF}">
-              <a14:hiddenLine xmlns="" xmlns:a14="http://schemas.microsoft.com/office/drawing/2010/main" w="9525">
+              <a14:hiddenLine xmlns:a14="http://schemas.microsoft.com/office/drawing/2010/main" xmlns="" w="9525">
                 <a:solidFill>
                   <a:srgbClr val="000000"/>
                 </a:solidFill>
@@ -36247,7 +36193,7 @@
         <a:effectLst/>
         <a:extLst>
           <a:ext uri="{AF507438-7753-43e0-B8FC-AC1667EBCBE1}">
-            <a14:hiddenEffects xmlns="" xmlns:a14="http://schemas.microsoft.com/office/drawing/2010/main">
+            <a14:hiddenEffects xmlns:a14="http://schemas.microsoft.com/office/drawing/2010/main" xmlns="">
               <a:effectLst>
                 <a:outerShdw blurRad="63500" dist="38099" dir="2700000" algn="ctr" rotWithShape="0">
                   <a:schemeClr val="bg2">
@@ -36325,7 +36271,7 @@
         <a:effectLst/>
         <a:extLst>
           <a:ext uri="{AF507438-7753-43e0-B8FC-AC1667EBCBE1}">
-            <a14:hiddenEffects xmlns="" xmlns:a14="http://schemas.microsoft.com/office/drawing/2010/main">
+            <a14:hiddenEffects xmlns:a14="http://schemas.microsoft.com/office/drawing/2010/main" xmlns="">
               <a:effectLst>
                 <a:outerShdw blurRad="63500" dist="38099" dir="2700000" algn="ctr" rotWithShape="0">
                   <a:schemeClr val="bg2">

</xml_diff>